<commit_message>
Updated Project Report with Synthesis reports.
</commit_message>
<xml_diff>
--- a/Project_Report/ASIC for Neural Network inference_P_V_Rajesh_Kumar.pptx
+++ b/Project_Report/ASIC for Neural Network inference_P_V_Rajesh_Kumar.pptx
@@ -3496,7 +3496,7 @@
         <p:spPr>
           <a:xfrm>
             <a:off x="463702" y="843533"/>
-            <a:ext cx="8314538" cy="5706690"/>
+            <a:ext cx="8314538" cy="5245026"/>
           </a:xfrm>
           <a:prstGeom prst="rect">
             <a:avLst/>
@@ -4167,102 +4167,6 @@
                 <a:cs typeface="Candara"/>
               </a:rPr>
               <a:t>Floating to Fixed point conversion causes the error. Increasing the bit width we can achieve more accuracy</a:t>
-            </a:r>
-            <a:endParaRPr sz="2000" dirty="0">
-              <a:latin typeface="Candara"/>
-              <a:cs typeface="Candara"/>
-            </a:endParaRPr>
-          </a:p>
-          <a:p>
-            <a:pPr marL="354965" indent="-342265">
-              <a:lnSpc>
-                <a:spcPct val="100000"/>
-              </a:lnSpc>
-              <a:spcBef>
-                <a:spcPts val="1200"/>
-              </a:spcBef>
-              <a:buFont typeface="Arial"/>
-              <a:buChar char="•"/>
-              <a:tabLst>
-                <a:tab pos="354965" algn="l"/>
-              </a:tabLst>
-            </a:pPr>
-            <a:r>
-              <a:rPr sz="2000" dirty="0">
-                <a:latin typeface="Candara"/>
-                <a:cs typeface="Candara"/>
-              </a:rPr>
-              <a:t>NOTE:</a:t>
-            </a:r>
-            <a:r>
-              <a:rPr sz="2000" spc="-45" dirty="0">
-                <a:latin typeface="Candara"/>
-                <a:cs typeface="Candara"/>
-              </a:rPr>
-              <a:t> </a:t>
-            </a:r>
-            <a:r>
-              <a:rPr sz="2000" dirty="0">
-                <a:latin typeface="Candara"/>
-                <a:cs typeface="Candara"/>
-              </a:rPr>
-              <a:t>Do</a:t>
-            </a:r>
-            <a:r>
-              <a:rPr sz="2000" spc="-25" dirty="0">
-                <a:latin typeface="Candara"/>
-                <a:cs typeface="Candara"/>
-              </a:rPr>
-              <a:t> </a:t>
-            </a:r>
-            <a:r>
-              <a:rPr sz="2000" dirty="0">
-                <a:latin typeface="Candara"/>
-                <a:cs typeface="Candara"/>
-              </a:rPr>
-              <a:t>not</a:t>
-            </a:r>
-            <a:r>
-              <a:rPr sz="2000" spc="-20" dirty="0">
-                <a:latin typeface="Candara"/>
-                <a:cs typeface="Candara"/>
-              </a:rPr>
-              <a:t> </a:t>
-            </a:r>
-            <a:r>
-              <a:rPr sz="2000" dirty="0">
-                <a:latin typeface="Candara"/>
-                <a:cs typeface="Candara"/>
-              </a:rPr>
-              <a:t>change</a:t>
-            </a:r>
-            <a:r>
-              <a:rPr sz="2000" spc="-15" dirty="0">
-                <a:latin typeface="Candara"/>
-                <a:cs typeface="Candara"/>
-              </a:rPr>
-              <a:t> </a:t>
-            </a:r>
-            <a:r>
-              <a:rPr sz="2000" dirty="0">
-                <a:latin typeface="Candara"/>
-                <a:cs typeface="Candara"/>
-              </a:rPr>
-              <a:t>this</a:t>
-            </a:r>
-            <a:r>
-              <a:rPr sz="2000" spc="-25" dirty="0">
-                <a:latin typeface="Candara"/>
-                <a:cs typeface="Candara"/>
-              </a:rPr>
-              <a:t> </a:t>
-            </a:r>
-            <a:r>
-              <a:rPr sz="2000" spc="-10" dirty="0">
-                <a:latin typeface="Candara"/>
-                <a:cs typeface="Candara"/>
-              </a:rPr>
-              <a:t>slide</a:t>
             </a:r>
             <a:endParaRPr sz="2000" dirty="0">
               <a:latin typeface="Candara"/>
@@ -4603,10 +4507,10 @@
       </p:sp>
       <p:graphicFrame>
         <p:nvGraphicFramePr>
-          <p:cNvPr id="6" name="Object 5">
+          <p:cNvPr id="10" name="Object 9">
             <a:extLst>
               <a:ext uri="{FF2B5EF4-FFF2-40B4-BE49-F238E27FC236}">
-                <a16:creationId xmlns:a16="http://schemas.microsoft.com/office/drawing/2014/main" id="{8B7D3D3C-9276-5F92-6094-D29ABEADFE7C}"/>
+                <a16:creationId xmlns:a16="http://schemas.microsoft.com/office/drawing/2014/main" id="{4D6B58BD-B090-0360-B528-0DE0B5DC402F}"/>
               </a:ext>
             </a:extLst>
           </p:cNvPr>
@@ -4616,25 +4520,25 @@
           <p:nvPr>
             <p:extLst>
               <p:ext uri="{D42A27DB-BD31-4B8C-83A1-F6EECF244321}">
-                <p14:modId xmlns:p14="http://schemas.microsoft.com/office/powerpoint/2010/main" val="1424911844"/>
+                <p14:modId xmlns:p14="http://schemas.microsoft.com/office/powerpoint/2010/main" val="279034129"/>
               </p:ext>
             </p:extLst>
           </p:nvPr>
         </p:nvGraphicFramePr>
         <p:xfrm>
-          <a:off x="806283" y="1958899"/>
-          <a:ext cx="695325" cy="514350"/>
+          <a:off x="1016000" y="2057400"/>
+          <a:ext cx="771525" cy="514350"/>
         </p:xfrm>
         <a:graphic>
           <a:graphicData uri="http://schemas.openxmlformats.org/presentationml/2006/ole">
             <mc:AlternateContent xmlns:mc="http://schemas.openxmlformats.org/markup-compatibility/2006">
               <mc:Choice xmlns:v="urn:schemas-microsoft-com:vml" Requires="v">
-                <p:oleObj name="Packager Shell Object" showAsIcon="1" r:id="rId2" imgW="695231" imgH="514350" progId="Package">
+                <p:oleObj name="Packager Shell Object" showAsIcon="1" r:id="rId2" imgW="771401" imgH="514350" progId="Package">
                   <p:embed/>
                 </p:oleObj>
               </mc:Choice>
               <mc:Fallback>
-                <p:oleObj name="Packager Shell Object" showAsIcon="1" r:id="rId2" imgW="695231" imgH="514350" progId="Package">
+                <p:oleObj name="Packager Shell Object" showAsIcon="1" r:id="rId2" imgW="771401" imgH="514350" progId="Package">
                   <p:embed/>
                   <p:pic>
                     <p:nvPicPr>
@@ -4650,8 +4554,8 @@
                     </p:blipFill>
                     <p:spPr>
                       <a:xfrm>
-                        <a:off x="806283" y="1958899"/>
-                        <a:ext cx="695325" cy="514350"/>
+                        <a:off x="1016000" y="2057400"/>
+                        <a:ext cx="771525" cy="514350"/>
                       </a:xfrm>
                       <a:prstGeom prst="rect">
                         <a:avLst/>
@@ -4666,10 +4570,10 @@
       </p:graphicFrame>
       <p:graphicFrame>
         <p:nvGraphicFramePr>
-          <p:cNvPr id="7" name="Object 6">
+          <p:cNvPr id="13" name="Object 12">
             <a:extLst>
               <a:ext uri="{FF2B5EF4-FFF2-40B4-BE49-F238E27FC236}">
-                <a16:creationId xmlns:a16="http://schemas.microsoft.com/office/drawing/2014/main" id="{2331469C-163B-C061-7839-8DEBAC8AF6FF}"/>
+                <a16:creationId xmlns:a16="http://schemas.microsoft.com/office/drawing/2014/main" id="{E6AB7B6E-E8F9-BA72-98CB-165C78C67F21}"/>
               </a:ext>
             </a:extLst>
           </p:cNvPr>
@@ -4679,25 +4583,25 @@
           <p:nvPr>
             <p:extLst>
               <p:ext uri="{D42A27DB-BD31-4B8C-83A1-F6EECF244321}">
-                <p14:modId xmlns:p14="http://schemas.microsoft.com/office/powerpoint/2010/main" val="3816971395"/>
+                <p14:modId xmlns:p14="http://schemas.microsoft.com/office/powerpoint/2010/main" val="3758002748"/>
               </p:ext>
             </p:extLst>
           </p:nvPr>
         </p:nvGraphicFramePr>
         <p:xfrm>
-          <a:off x="344830" y="4127577"/>
-          <a:ext cx="1495425" cy="514350"/>
+          <a:off x="1840255" y="2027336"/>
+          <a:ext cx="438150" cy="514350"/>
         </p:xfrm>
         <a:graphic>
           <a:graphicData uri="http://schemas.openxmlformats.org/presentationml/2006/ole">
             <mc:AlternateContent xmlns:mc="http://schemas.openxmlformats.org/markup-compatibility/2006">
               <mc:Choice xmlns:v="urn:schemas-microsoft-com:vml" Requires="v">
-                <p:oleObj name="Packager Shell Object" showAsIcon="1" r:id="rId4" imgW="1495376" imgH="514350" progId="Package">
+                <p:oleObj name="Packager Shell Object" showAsIcon="1" r:id="rId4" imgW="437978" imgH="514350" progId="Package">
                   <p:embed/>
                 </p:oleObj>
               </mc:Choice>
               <mc:Fallback>
-                <p:oleObj name="Packager Shell Object" showAsIcon="1" r:id="rId4" imgW="1495376" imgH="514350" progId="Package">
+                <p:oleObj name="Packager Shell Object" showAsIcon="1" r:id="rId4" imgW="437978" imgH="514350" progId="Package">
                   <p:embed/>
                   <p:pic>
                     <p:nvPicPr>
@@ -4713,8 +4617,8 @@
                     </p:blipFill>
                     <p:spPr>
                       <a:xfrm>
-                        <a:off x="344830" y="4127577"/>
-                        <a:ext cx="1495425" cy="514350"/>
+                        <a:off x="1840255" y="2027336"/>
+                        <a:ext cx="438150" cy="514350"/>
                       </a:xfrm>
                       <a:prstGeom prst="rect">
                         <a:avLst/>
@@ -4729,10 +4633,10 @@
       </p:graphicFrame>
       <p:graphicFrame>
         <p:nvGraphicFramePr>
-          <p:cNvPr id="8" name="Object 7">
+          <p:cNvPr id="14" name="Object 13">
             <a:extLst>
               <a:ext uri="{FF2B5EF4-FFF2-40B4-BE49-F238E27FC236}">
-                <a16:creationId xmlns:a16="http://schemas.microsoft.com/office/drawing/2014/main" id="{AF2F4BEB-AA14-891F-96F3-EE750F3F9C82}"/>
+                <a16:creationId xmlns:a16="http://schemas.microsoft.com/office/drawing/2014/main" id="{E5AF915B-6E37-018F-7816-0DECA3E82D3A}"/>
               </a:ext>
             </a:extLst>
           </p:cNvPr>
@@ -4742,25 +4646,25 @@
           <p:nvPr>
             <p:extLst>
               <p:ext uri="{D42A27DB-BD31-4B8C-83A1-F6EECF244321}">
-                <p14:modId xmlns:p14="http://schemas.microsoft.com/office/powerpoint/2010/main" val="3127870688"/>
+                <p14:modId xmlns:p14="http://schemas.microsoft.com/office/powerpoint/2010/main" val="464092023"/>
               </p:ext>
             </p:extLst>
           </p:nvPr>
         </p:nvGraphicFramePr>
         <p:xfrm>
-          <a:off x="682269" y="2901512"/>
-          <a:ext cx="723900" cy="514350"/>
+          <a:off x="2461831" y="2027336"/>
+          <a:ext cx="619125" cy="514350"/>
         </p:xfrm>
         <a:graphic>
           <a:graphicData uri="http://schemas.openxmlformats.org/presentationml/2006/ole">
             <mc:AlternateContent xmlns:mc="http://schemas.openxmlformats.org/markup-compatibility/2006">
               <mc:Choice xmlns:v="urn:schemas-microsoft-com:vml" Requires="v">
-                <p:oleObj name="Packager Shell Object" showAsIcon="1" r:id="rId6" imgW="723975" imgH="514350" progId="Package">
+                <p:oleObj name="Packager Shell Object" showAsIcon="1" r:id="rId6" imgW="619061" imgH="514350" progId="Package">
                   <p:embed/>
                 </p:oleObj>
               </mc:Choice>
               <mc:Fallback>
-                <p:oleObj name="Packager Shell Object" showAsIcon="1" r:id="rId6" imgW="723975" imgH="514350" progId="Package">
+                <p:oleObj name="Packager Shell Object" showAsIcon="1" r:id="rId6" imgW="619061" imgH="514350" progId="Package">
                   <p:embed/>
                   <p:pic>
                     <p:nvPicPr>
@@ -4776,7 +4680,70 @@
                     </p:blipFill>
                     <p:spPr>
                       <a:xfrm>
-                        <a:off x="682269" y="2901512"/>
+                        <a:off x="2461831" y="2027336"/>
+                        <a:ext cx="619125" cy="514350"/>
+                      </a:xfrm>
+                      <a:prstGeom prst="rect">
+                        <a:avLst/>
+                      </a:prstGeom>
+                    </p:spPr>
+                  </p:pic>
+                </p:oleObj>
+              </mc:Fallback>
+            </mc:AlternateContent>
+          </a:graphicData>
+        </a:graphic>
+      </p:graphicFrame>
+      <p:graphicFrame>
+        <p:nvGraphicFramePr>
+          <p:cNvPr id="15" name="Object 14">
+            <a:extLst>
+              <a:ext uri="{FF2B5EF4-FFF2-40B4-BE49-F238E27FC236}">
+                <a16:creationId xmlns:a16="http://schemas.microsoft.com/office/drawing/2014/main" id="{0ECD2322-9B87-8ADB-1A42-774F3C116FD1}"/>
+              </a:ext>
+            </a:extLst>
+          </p:cNvPr>
+          <p:cNvGraphicFramePr>
+            <a:graphicFrameLocks noChangeAspect="1"/>
+          </p:cNvGraphicFramePr>
+          <p:nvPr>
+            <p:extLst>
+              <p:ext uri="{D42A27DB-BD31-4B8C-83A1-F6EECF244321}">
+                <p14:modId xmlns:p14="http://schemas.microsoft.com/office/powerpoint/2010/main" val="1025717753"/>
+              </p:ext>
+            </p:extLst>
+          </p:nvPr>
+        </p:nvGraphicFramePr>
+        <p:xfrm>
+          <a:off x="3772471" y="2067249"/>
+          <a:ext cx="723900" cy="514350"/>
+        </p:xfrm>
+        <a:graphic>
+          <a:graphicData uri="http://schemas.openxmlformats.org/presentationml/2006/ole">
+            <mc:AlternateContent xmlns:mc="http://schemas.openxmlformats.org/markup-compatibility/2006">
+              <mc:Choice xmlns:v="urn:schemas-microsoft-com:vml" Requires="v">
+                <p:oleObj name="Packager Shell Object" showAsIcon="1" r:id="rId8" imgW="723975" imgH="514350" progId="Package">
+                  <p:embed/>
+                </p:oleObj>
+              </mc:Choice>
+              <mc:Fallback>
+                <p:oleObj name="Packager Shell Object" showAsIcon="1" r:id="rId8" imgW="723975" imgH="514350" progId="Package">
+                  <p:embed/>
+                  <p:pic>
+                    <p:nvPicPr>
+                      <p:cNvPr id="0" name=""/>
+                      <p:cNvPicPr/>
+                      <p:nvPr/>
+                    </p:nvPicPr>
+                    <p:blipFill>
+                      <a:blip r:embed="rId9"/>
+                      <a:stretch>
+                        <a:fillRect/>
+                      </a:stretch>
+                    </p:blipFill>
+                    <p:spPr>
+                      <a:xfrm>
+                        <a:off x="3772471" y="2067249"/>
                         <a:ext cx="723900" cy="514350"/>
                       </a:xfrm>
                       <a:prstGeom prst="rect">
@@ -4792,10 +4759,10 @@
       </p:graphicFrame>
       <p:graphicFrame>
         <p:nvGraphicFramePr>
-          <p:cNvPr id="9" name="Object 8">
+          <p:cNvPr id="16" name="Object 15">
             <a:extLst>
               <a:ext uri="{FF2B5EF4-FFF2-40B4-BE49-F238E27FC236}">
-                <a16:creationId xmlns:a16="http://schemas.microsoft.com/office/drawing/2014/main" id="{42C1B6DC-8360-ED2D-E59E-2105A27D52CD}"/>
+                <a16:creationId xmlns:a16="http://schemas.microsoft.com/office/drawing/2014/main" id="{275CA2FF-C91B-BB90-2879-57B412E353F4}"/>
               </a:ext>
             </a:extLst>
           </p:cNvPr>
@@ -4805,25 +4772,25 @@
           <p:nvPr>
             <p:extLst>
               <p:ext uri="{D42A27DB-BD31-4B8C-83A1-F6EECF244321}">
-                <p14:modId xmlns:p14="http://schemas.microsoft.com/office/powerpoint/2010/main" val="2507198819"/>
+                <p14:modId xmlns:p14="http://schemas.microsoft.com/office/powerpoint/2010/main" val="3258885463"/>
               </p:ext>
             </p:extLst>
           </p:nvPr>
         </p:nvGraphicFramePr>
         <p:xfrm>
-          <a:off x="482942" y="4983438"/>
+          <a:off x="4544021" y="2057400"/>
           <a:ext cx="1219200" cy="514350"/>
         </p:xfrm>
         <a:graphic>
           <a:graphicData uri="http://schemas.openxmlformats.org/presentationml/2006/ole">
             <mc:AlternateContent xmlns:mc="http://schemas.openxmlformats.org/markup-compatibility/2006">
               <mc:Choice xmlns:v="urn:schemas-microsoft-com:vml" Requires="v">
-                <p:oleObj name="Packager Shell Object" showAsIcon="1" r:id="rId8" imgW="1219080" imgH="514350" progId="Package">
+                <p:oleObj name="Packager Shell Object" showAsIcon="1" r:id="rId10" imgW="1219080" imgH="514350" progId="Package">
                   <p:embed/>
                 </p:oleObj>
               </mc:Choice>
               <mc:Fallback>
-                <p:oleObj name="Packager Shell Object" showAsIcon="1" r:id="rId8" imgW="1219080" imgH="514350" progId="Package">
+                <p:oleObj name="Packager Shell Object" showAsIcon="1" r:id="rId10" imgW="1219080" imgH="514350" progId="Package">
                   <p:embed/>
                   <p:pic>
                     <p:nvPicPr>
@@ -4832,14 +4799,14 @@
                       <p:nvPr/>
                     </p:nvPicPr>
                     <p:blipFill>
-                      <a:blip r:embed="rId9"/>
+                      <a:blip r:embed="rId11"/>
                       <a:stretch>
                         <a:fillRect/>
                       </a:stretch>
                     </p:blipFill>
                     <p:spPr>
                       <a:xfrm>
-                        <a:off x="482942" y="4983438"/>
+                        <a:off x="4544021" y="2057400"/>
                         <a:ext cx="1219200" cy="514350"/>
                       </a:xfrm>
                       <a:prstGeom prst="rect">
@@ -4853,6 +4820,136 @@
           </a:graphicData>
         </a:graphic>
       </p:graphicFrame>
+      <p:pic>
+        <p:nvPicPr>
+          <p:cNvPr id="18" name="Picture 17">
+            <a:extLst>
+              <a:ext uri="{FF2B5EF4-FFF2-40B4-BE49-F238E27FC236}">
+                <a16:creationId xmlns:a16="http://schemas.microsoft.com/office/drawing/2014/main" id="{B95EC2E8-A1DA-9183-7E44-A296559D038C}"/>
+              </a:ext>
+            </a:extLst>
+          </p:cNvPr>
+          <p:cNvPicPr>
+            <a:picLocks noChangeAspect="1"/>
+          </p:cNvPicPr>
+          <p:nvPr/>
+        </p:nvPicPr>
+        <p:blipFill>
+          <a:blip r:embed="rId12"/>
+          <a:stretch>
+            <a:fillRect/>
+          </a:stretch>
+        </p:blipFill>
+        <p:spPr>
+          <a:xfrm>
+            <a:off x="155079" y="3614510"/>
+            <a:ext cx="4801618" cy="2789159"/>
+          </a:xfrm>
+          <a:prstGeom prst="rect">
+            <a:avLst/>
+          </a:prstGeom>
+        </p:spPr>
+      </p:pic>
+      <p:pic>
+        <p:nvPicPr>
+          <p:cNvPr id="22" name="Picture 21">
+            <a:extLst>
+              <a:ext uri="{FF2B5EF4-FFF2-40B4-BE49-F238E27FC236}">
+                <a16:creationId xmlns:a16="http://schemas.microsoft.com/office/drawing/2014/main" id="{B9699A77-0B59-AFDA-CC54-84F70337A4F9}"/>
+              </a:ext>
+            </a:extLst>
+          </p:cNvPr>
+          <p:cNvPicPr>
+            <a:picLocks noChangeAspect="1"/>
+          </p:cNvPicPr>
+          <p:nvPr/>
+        </p:nvPicPr>
+        <p:blipFill>
+          <a:blip r:embed="rId13"/>
+          <a:stretch>
+            <a:fillRect/>
+          </a:stretch>
+        </p:blipFill>
+        <p:spPr>
+          <a:xfrm>
+            <a:off x="5028759" y="3604662"/>
+            <a:ext cx="3960162" cy="2789159"/>
+          </a:xfrm>
+          <a:prstGeom prst="rect">
+            <a:avLst/>
+          </a:prstGeom>
+        </p:spPr>
+      </p:pic>
+      <p:sp>
+        <p:nvSpPr>
+          <p:cNvPr id="23" name="TextBox 22">
+            <a:extLst>
+              <a:ext uri="{FF2B5EF4-FFF2-40B4-BE49-F238E27FC236}">
+                <a16:creationId xmlns:a16="http://schemas.microsoft.com/office/drawing/2014/main" id="{4852DC8A-7BB4-16A0-0633-A8F7823D6B8F}"/>
+              </a:ext>
+            </a:extLst>
+          </p:cNvPr>
+          <p:cNvSpPr txBox="1"/>
+          <p:nvPr/>
+        </p:nvSpPr>
+        <p:spPr>
+          <a:xfrm>
+            <a:off x="521208" y="2990088"/>
+            <a:ext cx="1056700" cy="369332"/>
+          </a:xfrm>
+          <a:prstGeom prst="rect">
+            <a:avLst/>
+          </a:prstGeom>
+          <a:noFill/>
+        </p:spPr>
+        <p:txBody>
+          <a:bodyPr wrap="none" rtlCol="0">
+            <a:spAutoFit/>
+          </a:bodyPr>
+          <a:lstStyle/>
+          <a:p>
+            <a:r>
+              <a:rPr lang="en-IN" b="1" u="sng" dirty="0"/>
+              <a:t>POWER</a:t>
+            </a:r>
+          </a:p>
+        </p:txBody>
+      </p:sp>
+      <p:sp>
+        <p:nvSpPr>
+          <p:cNvPr id="24" name="TextBox 23">
+            <a:extLst>
+              <a:ext uri="{FF2B5EF4-FFF2-40B4-BE49-F238E27FC236}">
+                <a16:creationId xmlns:a16="http://schemas.microsoft.com/office/drawing/2014/main" id="{7C2CDEA9-2F97-D9B7-A27E-97F2CF306567}"/>
+              </a:ext>
+            </a:extLst>
+          </p:cNvPr>
+          <p:cNvSpPr txBox="1"/>
+          <p:nvPr/>
+        </p:nvSpPr>
+        <p:spPr>
+          <a:xfrm>
+            <a:off x="5028759" y="3097944"/>
+            <a:ext cx="710451" cy="369332"/>
+          </a:xfrm>
+          <a:prstGeom prst="rect">
+            <a:avLst/>
+          </a:prstGeom>
+          <a:noFill/>
+        </p:spPr>
+        <p:txBody>
+          <a:bodyPr wrap="none" rtlCol="0">
+            <a:spAutoFit/>
+          </a:bodyPr>
+          <a:lstStyle/>
+          <a:p>
+            <a:r>
+              <a:rPr lang="en-IN" b="1" u="sng" dirty="0"/>
+              <a:t>QOR</a:t>
+            </a:r>
+          </a:p>
+        </p:txBody>
+      </p:sp>
     </p:spTree>
   </p:cSld>
   <p:clrMapOvr>
@@ -8154,7 +8251,7 @@
               <a:rPr lang="en-US" dirty="0">
                 <a:latin typeface="Candara"/>
               </a:rPr>
-              <a:t>10 Classification outputs one hot encoded (1 out of 10 is 1, rest are 0)</a:t>
+              <a:t>10 Classification outputs one hot encoded (1 out of 10 is 1, rest are 0) at last 10 bits.</a:t>
             </a:r>
             <a:endParaRPr lang="en-IN" dirty="0">
               <a:latin typeface="Candara"/>
@@ -9192,7 +9289,7 @@
         <p:spPr>
           <a:xfrm>
             <a:off x="344830" y="1184630"/>
-            <a:ext cx="8213954" cy="3860031"/>
+            <a:ext cx="8213954" cy="4783361"/>
           </a:xfrm>
           <a:prstGeom prst="rect">
             <a:avLst/>
@@ -9204,15 +9301,15 @@
           </a:bodyPr>
           <a:lstStyle/>
           <a:p>
-            <a:pPr marL="354965" indent="-342265">
+            <a:pPr marL="355600" indent="-342900">
               <a:lnSpc>
                 <a:spcPct val="100000"/>
               </a:lnSpc>
               <a:spcBef>
                 <a:spcPts val="1300"/>
               </a:spcBef>
-              <a:buFont typeface="Arial"/>
-              <a:buChar char="•"/>
+              <a:buFont typeface="Wingdings" panose="05000000000000000000" pitchFamily="2" charset="2"/>
+              <a:buChar char="Ø"/>
               <a:tabLst>
                 <a:tab pos="354965" algn="l"/>
               </a:tabLst>
@@ -9320,10 +9417,13 @@
                 <a:tab pos="354965" algn="l"/>
               </a:tabLst>
             </a:pPr>
-            <a:endParaRPr lang="en-IN" sz="2000" dirty="0">
-              <a:latin typeface="Candara"/>
-              <a:cs typeface="Candara"/>
-            </a:endParaRPr>
+            <a:r>
+              <a:rPr lang="en-IN" sz="2000" dirty="0">
+                <a:latin typeface="Candara"/>
+                <a:cs typeface="Candara"/>
+              </a:rPr>
+              <a:t>First MATLAB usage for HW algorithms development in Verilog </a:t>
+            </a:r>
           </a:p>
           <a:p>
             <a:pPr marL="354965" indent="-342265">
@@ -9344,7 +9444,21 @@
                 <a:latin typeface="Candara"/>
                 <a:cs typeface="Candara"/>
               </a:rPr>
-              <a:t>First MATLAB usage for HW algorithms development in Verilog </a:t>
+              <a:t>Cadence tools: Virtuoso for schematics, Genus for Synthesis, </a:t>
+            </a:r>
+            <a:r>
+              <a:rPr lang="en-IN" sz="2000" dirty="0" err="1">
+                <a:latin typeface="Candara"/>
+                <a:cs typeface="Candara"/>
+              </a:rPr>
+              <a:t>Innovus</a:t>
+            </a:r>
+            <a:r>
+              <a:rPr lang="en-IN" sz="2000" dirty="0">
+                <a:latin typeface="Candara"/>
+                <a:cs typeface="Candara"/>
+              </a:rPr>
+              <a:t> for Place &amp; Route.</a:t>
             </a:r>
           </a:p>
           <a:p>
@@ -9366,21 +9480,7 @@
                 <a:latin typeface="Candara"/>
                 <a:cs typeface="Candara"/>
               </a:rPr>
-              <a:t>Cadence tools: Virtuoso for schematics, Genus for Synthesis, </a:t>
-            </a:r>
-            <a:r>
-              <a:rPr lang="en-IN" sz="2000" dirty="0" err="1">
-                <a:latin typeface="Candara"/>
-                <a:cs typeface="Candara"/>
-              </a:rPr>
-              <a:t>Innovus</a:t>
-            </a:r>
-            <a:r>
-              <a:rPr lang="en-IN" sz="2000" dirty="0">
-                <a:latin typeface="Candara"/>
-                <a:cs typeface="Candara"/>
-              </a:rPr>
-              <a:t> for Place &amp; Route.</a:t>
+              <a:t>Machine Learning basics &amp; processing of a large data in HW for acceleration.</a:t>
             </a:r>
           </a:p>
           <a:p>
@@ -9402,7 +9502,7 @@
                 <a:latin typeface="Candara"/>
                 <a:cs typeface="Candara"/>
               </a:rPr>
-              <a:t>Machine Learning basics &amp; processing of a large data in HW for acceleration.</a:t>
+              <a:t>Machine Learning on how to do inference part of a sample test data</a:t>
             </a:r>
           </a:p>
           <a:p>
@@ -9419,10 +9519,13 @@
                 <a:tab pos="354965" algn="l"/>
               </a:tabLst>
             </a:pPr>
-            <a:endParaRPr lang="en-IN" sz="2000" dirty="0">
-              <a:latin typeface="Candara"/>
-              <a:cs typeface="Candara"/>
-            </a:endParaRPr>
+            <a:r>
+              <a:rPr lang="en-IN" sz="2000" dirty="0">
+                <a:latin typeface="Candara"/>
+                <a:cs typeface="Candara"/>
+              </a:rPr>
+              <a:t>Verilog coding for FPGA &amp; ASIC.</a:t>
+            </a:r>
           </a:p>
           <a:p>
             <a:pPr marL="354965" indent="-342265">
@@ -9439,76 +9542,50 @@
               </a:tabLst>
             </a:pPr>
             <a:r>
-              <a:rPr sz="2000" dirty="0">
-                <a:latin typeface="Candara"/>
-                <a:cs typeface="Candara"/>
-              </a:rPr>
-              <a:t>NOTE:</a:t>
-            </a:r>
-            <a:r>
-              <a:rPr sz="2000" spc="-35" dirty="0">
-                <a:latin typeface="Candara"/>
-                <a:cs typeface="Candara"/>
-              </a:rPr>
-              <a:t> </a:t>
-            </a:r>
-            <a:r>
-              <a:rPr sz="2000" dirty="0">
-                <a:latin typeface="Candara"/>
-                <a:cs typeface="Candara"/>
-              </a:rPr>
-              <a:t>Keep</a:t>
-            </a:r>
-            <a:r>
-              <a:rPr sz="2000" spc="-25" dirty="0">
-                <a:latin typeface="Candara"/>
-                <a:cs typeface="Candara"/>
-              </a:rPr>
-              <a:t> </a:t>
-            </a:r>
-            <a:r>
-              <a:rPr sz="2000" dirty="0">
-                <a:latin typeface="Candara"/>
-                <a:cs typeface="Candara"/>
-              </a:rPr>
-              <a:t>it</a:t>
-            </a:r>
-            <a:r>
-              <a:rPr sz="2000" spc="-10" dirty="0">
-                <a:latin typeface="Candara"/>
-                <a:cs typeface="Candara"/>
-              </a:rPr>
-              <a:t> </a:t>
-            </a:r>
-            <a:r>
-              <a:rPr sz="2000" dirty="0">
-                <a:latin typeface="Candara"/>
-                <a:cs typeface="Candara"/>
-              </a:rPr>
-              <a:t>to</a:t>
-            </a:r>
-            <a:r>
-              <a:rPr sz="2000" spc="-20" dirty="0">
-                <a:latin typeface="Candara"/>
-                <a:cs typeface="Candara"/>
-              </a:rPr>
-              <a:t> </a:t>
-            </a:r>
-            <a:r>
-              <a:rPr sz="2000" dirty="0">
-                <a:latin typeface="Candara"/>
-                <a:cs typeface="Candara"/>
-              </a:rPr>
-              <a:t>1 </a:t>
-            </a:r>
-            <a:r>
-              <a:rPr sz="2000" spc="-10" dirty="0">
-                <a:latin typeface="Candara"/>
-                <a:cs typeface="Candara"/>
-              </a:rPr>
-              <a:t>slide.</a:t>
-            </a:r>
-            <a:endParaRPr sz="2000" dirty="0">
+              <a:rPr lang="en-IN" sz="2000" dirty="0">
+                <a:latin typeface="Candara"/>
+                <a:cs typeface="Candara"/>
+              </a:rPr>
+              <a:t>Entire ASIC Flow from design to GDS.</a:t>
+            </a:r>
+          </a:p>
+          <a:p>
+            <a:pPr marL="354965" indent="-342265">
+              <a:lnSpc>
+                <a:spcPct val="100000"/>
+              </a:lnSpc>
+              <a:spcBef>
+                <a:spcPts val="1200"/>
+              </a:spcBef>
+              <a:buFont typeface="Arial"/>
+              <a:buChar char="•"/>
+              <a:tabLst>
+                <a:tab pos="354965" algn="l"/>
+              </a:tabLst>
+            </a:pPr>
+            <a:r>
+              <a:rPr lang="en-IN" sz="2000" dirty="0">
+                <a:latin typeface="Candara"/>
+                <a:cs typeface="Candara"/>
+              </a:rPr>
+              <a:t>Synthesis &amp; LEC issues of the Verilog code done and how to fix them.</a:t>
+            </a:r>
+          </a:p>
+          <a:p>
+            <a:pPr marL="354965" indent="-342265">
+              <a:lnSpc>
+                <a:spcPct val="100000"/>
+              </a:lnSpc>
+              <a:spcBef>
+                <a:spcPts val="1200"/>
+              </a:spcBef>
+              <a:buFont typeface="Arial"/>
+              <a:buChar char="•"/>
+              <a:tabLst>
+                <a:tab pos="354965" algn="l"/>
+              </a:tabLst>
+            </a:pPr>
+            <a:endParaRPr lang="en-IN" sz="2000" dirty="0">
               <a:latin typeface="Candara"/>
               <a:cs typeface="Candara"/>
             </a:endParaRPr>
@@ -10505,7 +10582,7 @@
         <p:spPr>
           <a:xfrm>
             <a:off x="522921" y="1498984"/>
-            <a:ext cx="7829550" cy="3860031"/>
+            <a:ext cx="7829550" cy="4752583"/>
           </a:xfrm>
           <a:prstGeom prst="rect">
             <a:avLst/>
@@ -10653,6 +10730,24 @@
             </a:endParaRPr>
           </a:p>
           <a:p>
+            <a:pPr marL="355600" lvl="3" indent="-342900">
+              <a:spcBef>
+                <a:spcPts val="1200"/>
+              </a:spcBef>
+              <a:buFont typeface="Wingdings" panose="05000000000000000000" pitchFamily="2" charset="2"/>
+              <a:buChar char="§"/>
+              <a:tabLst>
+                <a:tab pos="354965" algn="l"/>
+              </a:tabLst>
+            </a:pPr>
+            <a:r>
+              <a:rPr lang="en-IN" sz="1600" dirty="0">
+                <a:latin typeface="Candara"/>
+              </a:rPr>
+              <a:t>Generation of Verilog files for Modal Parameters</a:t>
+            </a:r>
+          </a:p>
+          <a:p>
             <a:pPr marL="355600" indent="-342900">
               <a:lnSpc>
                 <a:spcPct val="100000"/>
@@ -10821,7 +10916,43 @@
               <a:rPr lang="en-IN" sz="1600" dirty="0">
                 <a:latin typeface="Candara"/>
               </a:rPr>
-              <a:t>Made the code configurable</a:t>
+              <a:t>Made the code configurable for training, </a:t>
+            </a:r>
+            <a:r>
+              <a:rPr lang="en-IN" sz="1600" dirty="0" err="1">
+                <a:latin typeface="Candara"/>
+              </a:rPr>
+              <a:t>FixedPoint</a:t>
+            </a:r>
+            <a:r>
+              <a:rPr lang="en-IN" sz="1600" dirty="0">
+                <a:latin typeface="Candara"/>
+              </a:rPr>
+              <a:t> bits, Training, RELU Slope, Hidden Nodes, Generate Verilog files dump, Run with </a:t>
+            </a:r>
+            <a:r>
+              <a:rPr lang="en-IN" sz="1600" dirty="0" err="1">
+                <a:latin typeface="Candara"/>
+              </a:rPr>
+              <a:t>FixedPoint</a:t>
+            </a:r>
+            <a:r>
+              <a:rPr lang="en-IN" sz="1600" dirty="0">
+                <a:latin typeface="Candara"/>
+              </a:rPr>
+              <a:t> or Floating, RELU for </a:t>
+            </a:r>
+            <a:r>
+              <a:rPr lang="en-IN" sz="1600" dirty="0" err="1">
+                <a:latin typeface="Candara"/>
+              </a:rPr>
+              <a:t>FixedPoint</a:t>
+            </a:r>
+            <a:r>
+              <a:rPr lang="en-IN" sz="1600" dirty="0">
+                <a:latin typeface="Candara"/>
+              </a:rPr>
+              <a:t>.</a:t>
             </a:r>
           </a:p>
           <a:p>
@@ -11330,7 +11461,7 @@
               <a:rPr lang="en-IN" sz="1600" dirty="0">
                 <a:latin typeface="Candara"/>
               </a:rPr>
-              <a:t>Size of multiplier needed (Ex: 8 bit x 8 bit)</a:t>
+              <a:t>Size of multiplier needed</a:t>
             </a:r>
           </a:p>
           <a:p>
@@ -11560,7 +11691,7 @@
         <p:spPr>
           <a:xfrm>
             <a:off x="390550" y="1477238"/>
-            <a:ext cx="8387690" cy="2862322"/>
+            <a:ext cx="8387690" cy="2800767"/>
           </a:xfrm>
         </p:spPr>
         <p:txBody>
@@ -11677,7 +11808,7 @@
                 <a:latin typeface="Candara"/>
                 <a:cs typeface="Candara"/>
               </a:rPr>
-              <a:t>Added scripts for generating HW compatible i.e. Verilog code snippets for</a:t>
+              <a:t>Added scripts to generate HW Verilog code snippets, for Modal Parameters</a:t>
             </a:r>
           </a:p>
           <a:p>
@@ -11754,7 +11885,7 @@
             </a:pPr>
             <a:r>
               <a:rPr lang="en-IN" sz="1800" spc="-10" dirty="0"/>
-              <a:t>And, these files are configurable though global configuration Variables</a:t>
+              <a:t>And, these files are configurable though global configuration Variables in MATLAB</a:t>
             </a:r>
           </a:p>
         </p:txBody>

</xml_diff>

<commit_message>
Added more details to report in HW Architecture section.
</commit_message>
<xml_diff>
--- a/Project_Report/ASIC for Neural Network inference_P_V_Rajesh_Kumar.pptx
+++ b/Project_Report/ASIC for Neural Network inference_P_V_Rajesh_Kumar.pptx
@@ -4,6 +4,9 @@
   <p:sldMasterIdLst>
     <p:sldMasterId id="2147483648" r:id="rId1"/>
   </p:sldMasterIdLst>
+  <p:notesMasterIdLst>
+    <p:notesMasterId r:id="rId26"/>
+  </p:notesMasterIdLst>
   <p:sldIdLst>
     <p:sldId id="256" r:id="rId2"/>
     <p:sldId id="257" r:id="rId3"/>
@@ -63,6 +66,440 @@
     </p:ext>
   </p:extLst>
 </p:presentation>
+</file>
+
+<file path=ppt/notesMasters/notesMaster1.xml><?xml version="1.0" encoding="utf-8"?>
+<p:notesMaster xmlns:a="http://schemas.openxmlformats.org/drawingml/2006/main" xmlns:r="http://schemas.openxmlformats.org/officeDocument/2006/relationships" xmlns:p="http://schemas.openxmlformats.org/presentationml/2006/main">
+  <p:cSld>
+    <p:bg>
+      <p:bgRef idx="1001">
+        <a:schemeClr val="bg1"/>
+      </p:bgRef>
+    </p:bg>
+    <p:spTree>
+      <p:nvGrpSpPr>
+        <p:cNvPr id="1" name=""/>
+        <p:cNvGrpSpPr/>
+        <p:nvPr/>
+      </p:nvGrpSpPr>
+      <p:grpSpPr>
+        <a:xfrm>
+          <a:off x="0" y="0"/>
+          <a:ext cx="0" cy="0"/>
+          <a:chOff x="0" y="0"/>
+          <a:chExt cx="0" cy="0"/>
+        </a:xfrm>
+      </p:grpSpPr>
+      <p:sp>
+        <p:nvSpPr>
+          <p:cNvPr id="2" name="Header Placeholder 1"/>
+          <p:cNvSpPr>
+            <a:spLocks noGrp="1"/>
+          </p:cNvSpPr>
+          <p:nvPr>
+            <p:ph type="hdr" sz="quarter"/>
+          </p:nvPr>
+        </p:nvSpPr>
+        <p:spPr>
+          <a:xfrm>
+            <a:off x="0" y="0"/>
+            <a:ext cx="3962400" cy="344488"/>
+          </a:xfrm>
+          <a:prstGeom prst="rect">
+            <a:avLst/>
+          </a:prstGeom>
+        </p:spPr>
+        <p:txBody>
+          <a:bodyPr vert="horz" lIns="91440" tIns="45720" rIns="91440" bIns="45720" rtlCol="0"/>
+          <a:lstStyle>
+            <a:lvl1pPr algn="l">
+              <a:defRPr sz="1200"/>
+            </a:lvl1pPr>
+          </a:lstStyle>
+          <a:p>
+            <a:endParaRPr lang="en-IN"/>
+          </a:p>
+        </p:txBody>
+      </p:sp>
+      <p:sp>
+        <p:nvSpPr>
+          <p:cNvPr id="3" name="Date Placeholder 2"/>
+          <p:cNvSpPr>
+            <a:spLocks noGrp="1"/>
+          </p:cNvSpPr>
+          <p:nvPr>
+            <p:ph type="dt" idx="1"/>
+          </p:nvPr>
+        </p:nvSpPr>
+        <p:spPr>
+          <a:xfrm>
+            <a:off x="5180013" y="0"/>
+            <a:ext cx="3962400" cy="344488"/>
+          </a:xfrm>
+          <a:prstGeom prst="rect">
+            <a:avLst/>
+          </a:prstGeom>
+        </p:spPr>
+        <p:txBody>
+          <a:bodyPr vert="horz" lIns="91440" tIns="45720" rIns="91440" bIns="45720" rtlCol="0"/>
+          <a:lstStyle>
+            <a:lvl1pPr algn="r">
+              <a:defRPr sz="1200"/>
+            </a:lvl1pPr>
+          </a:lstStyle>
+          <a:p>
+            <a:fld id="{BA6A18BC-8377-41FB-854C-CD5DE3F7CB9E}" type="datetimeFigureOut">
+              <a:rPr lang="en-IN" smtClean="0"/>
+              <a:t>09-04-2024</a:t>
+            </a:fld>
+            <a:endParaRPr lang="en-IN"/>
+          </a:p>
+        </p:txBody>
+      </p:sp>
+      <p:sp>
+        <p:nvSpPr>
+          <p:cNvPr id="4" name="Slide Image Placeholder 3"/>
+          <p:cNvSpPr>
+            <a:spLocks noGrp="1" noRot="1" noChangeAspect="1"/>
+          </p:cNvSpPr>
+          <p:nvPr>
+            <p:ph type="sldImg" idx="2"/>
+          </p:nvPr>
+        </p:nvSpPr>
+        <p:spPr>
+          <a:xfrm>
+            <a:off x="3028950" y="857250"/>
+            <a:ext cx="3086100" cy="2314575"/>
+          </a:xfrm>
+          <a:prstGeom prst="rect">
+            <a:avLst/>
+          </a:prstGeom>
+          <a:noFill/>
+          <a:ln w="12700">
+            <a:solidFill>
+              <a:prstClr val="black"/>
+            </a:solidFill>
+          </a:ln>
+        </p:spPr>
+        <p:txBody>
+          <a:bodyPr vert="horz" lIns="91440" tIns="45720" rIns="91440" bIns="45720" rtlCol="0" anchor="ctr"/>
+          <a:lstStyle/>
+          <a:p>
+            <a:endParaRPr lang="en-IN"/>
+          </a:p>
+        </p:txBody>
+      </p:sp>
+      <p:sp>
+        <p:nvSpPr>
+          <p:cNvPr id="5" name="Notes Placeholder 4"/>
+          <p:cNvSpPr>
+            <a:spLocks noGrp="1"/>
+          </p:cNvSpPr>
+          <p:nvPr>
+            <p:ph type="body" sz="quarter" idx="3"/>
+          </p:nvPr>
+        </p:nvSpPr>
+        <p:spPr>
+          <a:xfrm>
+            <a:off x="914400" y="3300413"/>
+            <a:ext cx="7315200" cy="2700337"/>
+          </a:xfrm>
+          <a:prstGeom prst="rect">
+            <a:avLst/>
+          </a:prstGeom>
+        </p:spPr>
+        <p:txBody>
+          <a:bodyPr vert="horz" lIns="91440" tIns="45720" rIns="91440" bIns="45720" rtlCol="0"/>
+          <a:lstStyle/>
+          <a:p>
+            <a:pPr lvl="0"/>
+            <a:r>
+              <a:rPr lang="en-US"/>
+              <a:t>Click to edit Master text styles</a:t>
+            </a:r>
+          </a:p>
+          <a:p>
+            <a:pPr lvl="1"/>
+            <a:r>
+              <a:rPr lang="en-US"/>
+              <a:t>Second level</a:t>
+            </a:r>
+          </a:p>
+          <a:p>
+            <a:pPr lvl="2"/>
+            <a:r>
+              <a:rPr lang="en-US"/>
+              <a:t>Third level</a:t>
+            </a:r>
+          </a:p>
+          <a:p>
+            <a:pPr lvl="3"/>
+            <a:r>
+              <a:rPr lang="en-US"/>
+              <a:t>Fourth level</a:t>
+            </a:r>
+          </a:p>
+          <a:p>
+            <a:pPr lvl="4"/>
+            <a:r>
+              <a:rPr lang="en-US"/>
+              <a:t>Fifth level</a:t>
+            </a:r>
+            <a:endParaRPr lang="en-IN"/>
+          </a:p>
+        </p:txBody>
+      </p:sp>
+      <p:sp>
+        <p:nvSpPr>
+          <p:cNvPr id="6" name="Footer Placeholder 5"/>
+          <p:cNvSpPr>
+            <a:spLocks noGrp="1"/>
+          </p:cNvSpPr>
+          <p:nvPr>
+            <p:ph type="ftr" sz="quarter" idx="4"/>
+          </p:nvPr>
+        </p:nvSpPr>
+        <p:spPr>
+          <a:xfrm>
+            <a:off x="0" y="6513513"/>
+            <a:ext cx="3962400" cy="344487"/>
+          </a:xfrm>
+          <a:prstGeom prst="rect">
+            <a:avLst/>
+          </a:prstGeom>
+        </p:spPr>
+        <p:txBody>
+          <a:bodyPr vert="horz" lIns="91440" tIns="45720" rIns="91440" bIns="45720" rtlCol="0" anchor="b"/>
+          <a:lstStyle>
+            <a:lvl1pPr algn="l">
+              <a:defRPr sz="1200"/>
+            </a:lvl1pPr>
+          </a:lstStyle>
+          <a:p>
+            <a:endParaRPr lang="en-IN"/>
+          </a:p>
+        </p:txBody>
+      </p:sp>
+      <p:sp>
+        <p:nvSpPr>
+          <p:cNvPr id="7" name="Slide Number Placeholder 6"/>
+          <p:cNvSpPr>
+            <a:spLocks noGrp="1"/>
+          </p:cNvSpPr>
+          <p:nvPr>
+            <p:ph type="sldNum" sz="quarter" idx="5"/>
+          </p:nvPr>
+        </p:nvSpPr>
+        <p:spPr>
+          <a:xfrm>
+            <a:off x="5180013" y="6513513"/>
+            <a:ext cx="3962400" cy="344487"/>
+          </a:xfrm>
+          <a:prstGeom prst="rect">
+            <a:avLst/>
+          </a:prstGeom>
+        </p:spPr>
+        <p:txBody>
+          <a:bodyPr vert="horz" lIns="91440" tIns="45720" rIns="91440" bIns="45720" rtlCol="0" anchor="b"/>
+          <a:lstStyle>
+            <a:lvl1pPr algn="r">
+              <a:defRPr sz="1200"/>
+            </a:lvl1pPr>
+          </a:lstStyle>
+          <a:p>
+            <a:fld id="{6B12D881-FA86-47BF-A55B-99F8F7711FD6}" type="slidenum">
+              <a:rPr lang="en-IN" smtClean="0"/>
+              <a:t>‹#›</a:t>
+            </a:fld>
+            <a:endParaRPr lang="en-IN"/>
+          </a:p>
+        </p:txBody>
+      </p:sp>
+    </p:spTree>
+    <p:extLst>
+      <p:ext uri="{BB962C8B-B14F-4D97-AF65-F5344CB8AC3E}">
+        <p14:creationId xmlns:p14="http://schemas.microsoft.com/office/powerpoint/2010/main" val="2177642212"/>
+      </p:ext>
+    </p:extLst>
+  </p:cSld>
+  <p:clrMap bg1="lt1" tx1="dk1" bg2="lt2" tx2="dk2" accent1="accent1" accent2="accent2" accent3="accent3" accent4="accent4" accent5="accent5" accent6="accent6" hlink="hlink" folHlink="folHlink"/>
+  <p:notesStyle>
+    <a:lvl1pPr marL="0" algn="l" defTabSz="914400" rtl="0" eaLnBrk="1" latinLnBrk="0" hangingPunct="1">
+      <a:defRPr sz="1200" kern="1200">
+        <a:solidFill>
+          <a:schemeClr val="tx1"/>
+        </a:solidFill>
+        <a:latin typeface="+mn-lt"/>
+        <a:ea typeface="+mn-ea"/>
+        <a:cs typeface="+mn-cs"/>
+      </a:defRPr>
+    </a:lvl1pPr>
+    <a:lvl2pPr marL="457200" algn="l" defTabSz="914400" rtl="0" eaLnBrk="1" latinLnBrk="0" hangingPunct="1">
+      <a:defRPr sz="1200" kern="1200">
+        <a:solidFill>
+          <a:schemeClr val="tx1"/>
+        </a:solidFill>
+        <a:latin typeface="+mn-lt"/>
+        <a:ea typeface="+mn-ea"/>
+        <a:cs typeface="+mn-cs"/>
+      </a:defRPr>
+    </a:lvl2pPr>
+    <a:lvl3pPr marL="914400" algn="l" defTabSz="914400" rtl="0" eaLnBrk="1" latinLnBrk="0" hangingPunct="1">
+      <a:defRPr sz="1200" kern="1200">
+        <a:solidFill>
+          <a:schemeClr val="tx1"/>
+        </a:solidFill>
+        <a:latin typeface="+mn-lt"/>
+        <a:ea typeface="+mn-ea"/>
+        <a:cs typeface="+mn-cs"/>
+      </a:defRPr>
+    </a:lvl3pPr>
+    <a:lvl4pPr marL="1371600" algn="l" defTabSz="914400" rtl="0" eaLnBrk="1" latinLnBrk="0" hangingPunct="1">
+      <a:defRPr sz="1200" kern="1200">
+        <a:solidFill>
+          <a:schemeClr val="tx1"/>
+        </a:solidFill>
+        <a:latin typeface="+mn-lt"/>
+        <a:ea typeface="+mn-ea"/>
+        <a:cs typeface="+mn-cs"/>
+      </a:defRPr>
+    </a:lvl4pPr>
+    <a:lvl5pPr marL="1828800" algn="l" defTabSz="914400" rtl="0" eaLnBrk="1" latinLnBrk="0" hangingPunct="1">
+      <a:defRPr sz="1200" kern="1200">
+        <a:solidFill>
+          <a:schemeClr val="tx1"/>
+        </a:solidFill>
+        <a:latin typeface="+mn-lt"/>
+        <a:ea typeface="+mn-ea"/>
+        <a:cs typeface="+mn-cs"/>
+      </a:defRPr>
+    </a:lvl5pPr>
+    <a:lvl6pPr marL="2286000" algn="l" defTabSz="914400" rtl="0" eaLnBrk="1" latinLnBrk="0" hangingPunct="1">
+      <a:defRPr sz="1200" kern="1200">
+        <a:solidFill>
+          <a:schemeClr val="tx1"/>
+        </a:solidFill>
+        <a:latin typeface="+mn-lt"/>
+        <a:ea typeface="+mn-ea"/>
+        <a:cs typeface="+mn-cs"/>
+      </a:defRPr>
+    </a:lvl6pPr>
+    <a:lvl7pPr marL="2743200" algn="l" defTabSz="914400" rtl="0" eaLnBrk="1" latinLnBrk="0" hangingPunct="1">
+      <a:defRPr sz="1200" kern="1200">
+        <a:solidFill>
+          <a:schemeClr val="tx1"/>
+        </a:solidFill>
+        <a:latin typeface="+mn-lt"/>
+        <a:ea typeface="+mn-ea"/>
+        <a:cs typeface="+mn-cs"/>
+      </a:defRPr>
+    </a:lvl7pPr>
+    <a:lvl8pPr marL="3200400" algn="l" defTabSz="914400" rtl="0" eaLnBrk="1" latinLnBrk="0" hangingPunct="1">
+      <a:defRPr sz="1200" kern="1200">
+        <a:solidFill>
+          <a:schemeClr val="tx1"/>
+        </a:solidFill>
+        <a:latin typeface="+mn-lt"/>
+        <a:ea typeface="+mn-ea"/>
+        <a:cs typeface="+mn-cs"/>
+      </a:defRPr>
+    </a:lvl8pPr>
+    <a:lvl9pPr marL="3657600" algn="l" defTabSz="914400" rtl="0" eaLnBrk="1" latinLnBrk="0" hangingPunct="1">
+      <a:defRPr sz="1200" kern="1200">
+        <a:solidFill>
+          <a:schemeClr val="tx1"/>
+        </a:solidFill>
+        <a:latin typeface="+mn-lt"/>
+        <a:ea typeface="+mn-ea"/>
+        <a:cs typeface="+mn-cs"/>
+      </a:defRPr>
+    </a:lvl9pPr>
+  </p:notesStyle>
+</p:notesMaster>
+</file>
+
+<file path=ppt/notesSlides/notesSlide1.xml><?xml version="1.0" encoding="utf-8"?>
+<p:notes xmlns:a="http://schemas.openxmlformats.org/drawingml/2006/main" xmlns:r="http://schemas.openxmlformats.org/officeDocument/2006/relationships" xmlns:p="http://schemas.openxmlformats.org/presentationml/2006/main">
+  <p:cSld>
+    <p:spTree>
+      <p:nvGrpSpPr>
+        <p:cNvPr id="1" name=""/>
+        <p:cNvGrpSpPr/>
+        <p:nvPr/>
+      </p:nvGrpSpPr>
+      <p:grpSpPr>
+        <a:xfrm>
+          <a:off x="0" y="0"/>
+          <a:ext cx="0" cy="0"/>
+          <a:chOff x="0" y="0"/>
+          <a:chExt cx="0" cy="0"/>
+        </a:xfrm>
+      </p:grpSpPr>
+      <p:sp>
+        <p:nvSpPr>
+          <p:cNvPr id="2" name="Slide Image Placeholder 1"/>
+          <p:cNvSpPr>
+            <a:spLocks noGrp="1" noRot="1" noChangeAspect="1"/>
+          </p:cNvSpPr>
+          <p:nvPr>
+            <p:ph type="sldImg"/>
+          </p:nvPr>
+        </p:nvSpPr>
+        <p:spPr/>
+      </p:sp>
+      <p:sp>
+        <p:nvSpPr>
+          <p:cNvPr id="3" name="Notes Placeholder 2"/>
+          <p:cNvSpPr>
+            <a:spLocks noGrp="1"/>
+          </p:cNvSpPr>
+          <p:nvPr>
+            <p:ph type="body" idx="1"/>
+          </p:nvPr>
+        </p:nvSpPr>
+        <p:spPr/>
+        <p:txBody>
+          <a:bodyPr/>
+          <a:lstStyle/>
+          <a:p>
+            <a:endParaRPr lang="en-IN" dirty="0"/>
+          </a:p>
+        </p:txBody>
+      </p:sp>
+      <p:sp>
+        <p:nvSpPr>
+          <p:cNvPr id="4" name="Slide Number Placeholder 3"/>
+          <p:cNvSpPr>
+            <a:spLocks noGrp="1"/>
+          </p:cNvSpPr>
+          <p:nvPr>
+            <p:ph type="sldNum" sz="quarter" idx="5"/>
+          </p:nvPr>
+        </p:nvSpPr>
+        <p:spPr/>
+        <p:txBody>
+          <a:bodyPr/>
+          <a:lstStyle/>
+          <a:p>
+            <a:fld id="{6B12D881-FA86-47BF-A55B-99F8F7711FD6}" type="slidenum">
+              <a:rPr lang="en-IN" smtClean="0"/>
+              <a:t>9</a:t>
+            </a:fld>
+            <a:endParaRPr lang="en-IN"/>
+          </a:p>
+        </p:txBody>
+      </p:sp>
+    </p:spTree>
+    <p:extLst>
+      <p:ext uri="{BB962C8B-B14F-4D97-AF65-F5344CB8AC3E}">
+        <p14:creationId xmlns:p14="http://schemas.microsoft.com/office/powerpoint/2010/main" val="2506423059"/>
+      </p:ext>
+    </p:extLst>
+  </p:cSld>
+  <p:clrMapOvr>
+    <a:masterClrMapping/>
+  </p:clrMapOvr>
+</p:notes>
 </file>
 
 <file path=ppt/slideLayouts/slideLayout1.xml><?xml version="1.0" encoding="utf-8"?>
@@ -4295,7 +4732,7 @@
         <p:spPr>
           <a:xfrm>
             <a:off x="463702" y="843533"/>
-            <a:ext cx="8314538" cy="5245026"/>
+            <a:ext cx="8314538" cy="5706690"/>
           </a:xfrm>
           <a:prstGeom prst="rect">
             <a:avLst/>
@@ -4779,7 +5216,39 @@
               </a:rPr>
               <a:t>images)</a:t>
             </a:r>
-            <a:endParaRPr sz="2000" strike="sngStrike" dirty="0">
+            <a:endParaRPr lang="en-IN" sz="2000" strike="sngStrike" spc="-10" dirty="0">
+              <a:latin typeface="Candara"/>
+              <a:cs typeface="Candara"/>
+            </a:endParaRPr>
+          </a:p>
+          <a:p>
+            <a:pPr marL="812165" lvl="1" indent="-342265">
+              <a:lnSpc>
+                <a:spcPct val="100000"/>
+              </a:lnSpc>
+              <a:spcBef>
+                <a:spcPts val="1200"/>
+              </a:spcBef>
+              <a:buFont typeface="Arial"/>
+              <a:buChar char="•"/>
+              <a:tabLst>
+                <a:tab pos="812165" algn="l"/>
+              </a:tabLst>
+            </a:pPr>
+            <a:r>
+              <a:rPr lang="en-IN" sz="2000" spc="-10" dirty="0">
+                <a:highlight>
+                  <a:srgbClr val="FFFF00"/>
+                </a:highlight>
+                <a:latin typeface="Candara"/>
+                <a:cs typeface="Candara"/>
+              </a:rPr>
+              <a:t>Got stuck at Gate Level Simulation.</a:t>
+            </a:r>
+            <a:endParaRPr sz="2000" dirty="0">
+              <a:highlight>
+                <a:srgbClr val="FFFF00"/>
+              </a:highlight>
               <a:latin typeface="Candara"/>
               <a:cs typeface="Candara"/>
             </a:endParaRPr>
@@ -6140,9 +6609,6 @@
           </a:p>
           <a:p>
             <a:pPr marL="354965" indent="-342265">
-              <a:lnSpc>
-                <a:spcPct val="100000"/>
-              </a:lnSpc>
               <a:spcBef>
                 <a:spcPts val="105"/>
               </a:spcBef>
@@ -6152,6 +6618,16 @@
                 <a:tab pos="354965" algn="l"/>
               </a:tabLst>
             </a:pPr>
+            <a:r>
+              <a:rPr lang="en-US" sz="2000" spc="-10" dirty="0">
+                <a:highlight>
+                  <a:srgbClr val="FFFF00"/>
+                </a:highlight>
+                <a:latin typeface="Candara"/>
+                <a:cs typeface="Candara"/>
+              </a:rPr>
+              <a:t>Got stuck at Gate Level Simulation.</a:t>
+            </a:r>
             <a:r>
               <a:rPr lang="en-IN" sz="2000" spc="-25" dirty="0">
                 <a:highlight>
@@ -6160,7 +6636,7 @@
                 <a:latin typeface="Candara"/>
                 <a:cs typeface="Candara"/>
               </a:rPr>
-              <a:t>Not able to do this. But did for counter module.</a:t>
+              <a:t> But did for counter module.</a:t>
             </a:r>
           </a:p>
           <a:p>
@@ -6540,9 +7016,6 @@
           </a:p>
           <a:p>
             <a:pPr marL="354965" indent="-342265">
-              <a:lnSpc>
-                <a:spcPct val="100000"/>
-              </a:lnSpc>
               <a:spcBef>
                 <a:spcPts val="105"/>
               </a:spcBef>
@@ -6553,14 +7026,24 @@
               </a:tabLst>
             </a:pPr>
             <a:r>
-              <a:rPr lang="en-US" sz="2000" spc="-25" dirty="0">
+              <a:rPr lang="en-US" sz="2000" spc="-10" dirty="0">
                 <a:highlight>
                   <a:srgbClr val="FFFF00"/>
                 </a:highlight>
                 <a:latin typeface="Candara"/>
                 <a:cs typeface="Candara"/>
               </a:rPr>
-              <a:t>Not able to do this. But did for counter module.</a:t>
+              <a:t>Got stuck at Gate Level Simulation.</a:t>
+            </a:r>
+            <a:r>
+              <a:rPr lang="en-IN" sz="2000" spc="-25" dirty="0">
+                <a:highlight>
+                  <a:srgbClr val="FFFF00"/>
+                </a:highlight>
+                <a:latin typeface="Candara"/>
+                <a:cs typeface="Candara"/>
+              </a:rPr>
+              <a:t> But did for counter module.</a:t>
             </a:r>
           </a:p>
           <a:p>
@@ -6952,9 +7435,6 @@
           </a:p>
           <a:p>
             <a:pPr marL="354965" indent="-342265">
-              <a:lnSpc>
-                <a:spcPct val="100000"/>
-              </a:lnSpc>
               <a:spcBef>
                 <a:spcPts val="105"/>
               </a:spcBef>
@@ -6965,14 +7445,24 @@
               </a:tabLst>
             </a:pPr>
             <a:r>
-              <a:rPr lang="en-US" sz="2000" spc="-25" dirty="0">
+              <a:rPr lang="en-US" sz="2000" spc="-10" dirty="0">
                 <a:highlight>
                   <a:srgbClr val="FFFF00"/>
                 </a:highlight>
                 <a:latin typeface="Candara"/>
                 <a:cs typeface="Candara"/>
               </a:rPr>
-              <a:t>Not able to do this. But did for counter module.</a:t>
+              <a:t>Got stuck at Gate Level Simulation.</a:t>
+            </a:r>
+            <a:r>
+              <a:rPr lang="en-IN" sz="2000" spc="-25" dirty="0">
+                <a:highlight>
+                  <a:srgbClr val="FFFF00"/>
+                </a:highlight>
+                <a:latin typeface="Candara"/>
+                <a:cs typeface="Candara"/>
+              </a:rPr>
+              <a:t> But did for counter module.</a:t>
             </a:r>
           </a:p>
           <a:p>
@@ -7505,9 +7995,6 @@
           </a:p>
           <a:p>
             <a:pPr marL="354965" indent="-342265">
-              <a:lnSpc>
-                <a:spcPct val="100000"/>
-              </a:lnSpc>
               <a:spcBef>
                 <a:spcPts val="105"/>
               </a:spcBef>
@@ -7518,14 +8005,24 @@
               </a:tabLst>
             </a:pPr>
             <a:r>
-              <a:rPr lang="en-US" sz="2000" spc="-25" dirty="0">
+              <a:rPr lang="en-US" sz="2000" spc="-10" dirty="0">
                 <a:highlight>
                   <a:srgbClr val="FFFF00"/>
                 </a:highlight>
                 <a:latin typeface="Candara"/>
                 <a:cs typeface="Candara"/>
               </a:rPr>
-              <a:t>Not able to do this. But did for counter module.</a:t>
+              <a:t>Got stuck at Gate Level Simulation.</a:t>
+            </a:r>
+            <a:r>
+              <a:rPr lang="en-IN" sz="2000" spc="-25" dirty="0">
+                <a:highlight>
+                  <a:srgbClr val="FFFF00"/>
+                </a:highlight>
+                <a:latin typeface="Candara"/>
+                <a:cs typeface="Candara"/>
+              </a:rPr>
+              <a:t> But did for counter module.</a:t>
             </a:r>
           </a:p>
           <a:p>
@@ -7945,7 +8442,21 @@
                 <a:latin typeface="Candara"/>
                 <a:cs typeface="Candara"/>
               </a:rPr>
-              <a:t>Semeion Handwritten Digit Dataset (UCI ML Repository)</a:t>
+              <a:t>Semeion Handwritten Digit Dataset </a:t>
+            </a:r>
+            <a:r>
+              <a:rPr lang="en-IN" dirty="0" err="1">
+                <a:latin typeface="Candara"/>
+                <a:cs typeface="Candara"/>
+              </a:rPr>
+              <a:t>semeion.data</a:t>
+            </a:r>
+            <a:r>
+              <a:rPr lang="en-IN" dirty="0">
+                <a:latin typeface="Candara"/>
+                <a:cs typeface="Candara"/>
+              </a:rPr>
+              <a:t> (UCI ML Repository)</a:t>
             </a:r>
           </a:p>
           <a:p>
@@ -8616,7 +9127,7 @@
                 <a:latin typeface="Candara"/>
                 <a:cs typeface="Candara"/>
               </a:rPr>
-              <a:t>No peers able to share.</a:t>
+              <a:t>Not found any.</a:t>
             </a:r>
             <a:endParaRPr sz="2000" dirty="0">
               <a:highlight>
@@ -8841,7 +9352,7 @@
         <p:spPr>
           <a:xfrm>
             <a:off x="344830" y="1336675"/>
-            <a:ext cx="6245225" cy="1603644"/>
+            <a:ext cx="7885404" cy="1603644"/>
           </a:xfrm>
           <a:prstGeom prst="rect">
             <a:avLst/>
@@ -8997,9 +9508,6 @@
           </a:p>
           <a:p>
             <a:pPr marL="354965" indent="-342265">
-              <a:lnSpc>
-                <a:spcPct val="100000"/>
-              </a:lnSpc>
               <a:spcBef>
                 <a:spcPts val="105"/>
               </a:spcBef>
@@ -9010,14 +9518,24 @@
               </a:tabLst>
             </a:pPr>
             <a:r>
-              <a:rPr lang="en-US" sz="2000" spc="-25" dirty="0">
+              <a:rPr lang="en-US" sz="2000" spc="-10" dirty="0">
                 <a:highlight>
                   <a:srgbClr val="FFFF00"/>
                 </a:highlight>
                 <a:latin typeface="Candara"/>
                 <a:cs typeface="Candara"/>
               </a:rPr>
-              <a:t>Not able to do this. But did for counter module.</a:t>
+              <a:t>Got stuck at Gate Level Simulation.</a:t>
+            </a:r>
+            <a:r>
+              <a:rPr lang="en-IN" sz="2000" spc="-25" dirty="0">
+                <a:highlight>
+                  <a:srgbClr val="FFFF00"/>
+                </a:highlight>
+                <a:latin typeface="Candara"/>
+                <a:cs typeface="Candara"/>
+              </a:rPr>
+              <a:t> But did for counter module.</a:t>
             </a:r>
           </a:p>
           <a:p>
@@ -10088,7 +10606,7 @@
         <p:spPr>
           <a:xfrm>
             <a:off x="344830" y="1184630"/>
-            <a:ext cx="8213954" cy="4783361"/>
+            <a:ext cx="8213954" cy="5398914"/>
           </a:xfrm>
           <a:prstGeom prst="rect">
             <a:avLst/>
@@ -10221,7 +10739,7 @@
                 <a:latin typeface="Candara"/>
                 <a:cs typeface="Candara"/>
               </a:rPr>
-              <a:t>First MATLAB usage for HW algorithms development in Verilog </a:t>
+              <a:t>First MATLAB usage to develop HW algorithms as Proof of concept &amp; then implement them in Verilog for HW acceleration.</a:t>
             </a:r>
           </a:p>
           <a:p>
@@ -10323,7 +10841,7 @@
                 <a:latin typeface="Candara"/>
                 <a:cs typeface="Candara"/>
               </a:rPr>
-              <a:t>Verilog coding for FPGA &amp; ASIC.</a:t>
+              <a:t>Verilog coding differences between FPGA &amp; ASIC for synthesizable code.</a:t>
             </a:r>
           </a:p>
           <a:p>
@@ -10367,7 +10885,7 @@
                 <a:latin typeface="Candara"/>
                 <a:cs typeface="Candara"/>
               </a:rPr>
-              <a:t>Synthesis &amp; LEC issues of the Verilog code done and how to fix them.</a:t>
+              <a:t>Synthesis &amp; LEC issues of the initial Verilog code and how to fix them to make them Synthesizable for ASIC.</a:t>
             </a:r>
           </a:p>
           <a:p>
@@ -11380,8 +11898,8 @@
         </p:nvSpPr>
         <p:spPr>
           <a:xfrm>
-            <a:off x="522921" y="1498984"/>
-            <a:ext cx="7829550" cy="2536592"/>
+            <a:off x="645159" y="758883"/>
+            <a:ext cx="7829550" cy="2936701"/>
           </a:xfrm>
           <a:prstGeom prst="rect">
             <a:avLst/>
@@ -11465,10 +11983,16 @@
               </a:tabLst>
             </a:pPr>
             <a:r>
+              <a:rPr lang="en-US" sz="1600" dirty="0" err="1">
+                <a:latin typeface="Candara"/>
+              </a:rPr>
+              <a:t>Chnaged</a:t>
+            </a:r>
+            <a:r>
               <a:rPr lang="en-US" sz="1600" dirty="0">
                 <a:latin typeface="Candara"/>
               </a:rPr>
-              <a:t>Created Modal Parameters from Training</a:t>
+              <a:t> training parameters for Training accuracy: 99.3636%, Test accuracy: 90.8722%</a:t>
             </a:r>
           </a:p>
           <a:p>
@@ -11483,22 +12007,10 @@
               </a:tabLst>
             </a:pPr>
             <a:r>
-              <a:rPr lang="en-IN" sz="1600" dirty="0">
-                <a:latin typeface="Candara"/>
-              </a:rPr>
-              <a:t>Implemented </a:t>
-            </a:r>
-            <a:r>
-              <a:rPr lang="en-IN" sz="1600" dirty="0" err="1">
-                <a:latin typeface="Candara"/>
-              </a:rPr>
-              <a:t>Fixedpoint</a:t>
-            </a:r>
-            <a:r>
-              <a:rPr lang="en-IN" sz="1600" dirty="0">
-                <a:latin typeface="Candara"/>
-              </a:rPr>
-              <a:t> conversion</a:t>
+              <a:rPr lang="en-US" sz="1600" dirty="0">
+                <a:latin typeface="Candara"/>
+              </a:rPr>
+              <a:t>Created Modal Parameters from Training for above accuracy</a:t>
             </a:r>
           </a:p>
           <a:p>
@@ -11516,6 +12028,36 @@
               <a:rPr lang="en-IN" sz="1600" dirty="0">
                 <a:latin typeface="Candara"/>
               </a:rPr>
+              <a:t>Implemented </a:t>
+            </a:r>
+            <a:r>
+              <a:rPr lang="en-IN" sz="1600" dirty="0" err="1">
+                <a:latin typeface="Candara"/>
+              </a:rPr>
+              <a:t>Fixedpoint</a:t>
+            </a:r>
+            <a:r>
+              <a:rPr lang="en-IN" sz="1600" dirty="0">
+                <a:latin typeface="Candara"/>
+              </a:rPr>
+              <a:t> representation</a:t>
+            </a:r>
+          </a:p>
+          <a:p>
+            <a:pPr marL="355600" lvl="3" indent="-342900">
+              <a:spcBef>
+                <a:spcPts val="1200"/>
+              </a:spcBef>
+              <a:buFont typeface="Wingdings" panose="05000000000000000000" pitchFamily="2" charset="2"/>
+              <a:buChar char="§"/>
+              <a:tabLst>
+                <a:tab pos="354965" algn="l"/>
+              </a:tabLst>
+            </a:pPr>
+            <a:r>
+              <a:rPr lang="en-IN" sz="1600" dirty="0">
+                <a:latin typeface="Candara"/>
+              </a:rPr>
               <a:t>Implemented Inference part for Testing Input data using </a:t>
             </a:r>
             <a:r>
@@ -11524,9 +12066,12 @@
               </a:rPr>
               <a:t>FixedPoint</a:t>
             </a:r>
-            <a:endParaRPr lang="en-IN" sz="1600" dirty="0">
-              <a:latin typeface="Candara"/>
-            </a:endParaRPr>
+            <a:r>
+              <a:rPr lang="en-IN" sz="1600" dirty="0">
+                <a:latin typeface="Candara"/>
+              </a:rPr>
+              <a:t> representation</a:t>
+            </a:r>
           </a:p>
           <a:p>
             <a:pPr marL="355600" lvl="3" indent="-342900">
@@ -11589,8 +12134,8 @@
         </p:blipFill>
         <p:spPr>
           <a:xfrm>
-            <a:off x="1594636" y="3695584"/>
-            <a:ext cx="3449954" cy="2947125"/>
+            <a:off x="1207008" y="3364454"/>
+            <a:ext cx="3837582" cy="3278256"/>
           </a:xfrm>
           <a:prstGeom prst="rect">
             <a:avLst/>
@@ -12787,7 +13332,7 @@
         <p:spPr>
           <a:xfrm>
             <a:off x="390550" y="1477238"/>
-            <a:ext cx="8387690" cy="2800767"/>
+            <a:ext cx="8387690" cy="1815882"/>
           </a:xfrm>
         </p:spPr>
         <p:txBody>
@@ -12920,23 +13465,7 @@
             </a:pPr>
             <a:r>
               <a:rPr lang="en-IN" sz="1600" spc="-10" dirty="0"/>
-              <a:t>Weights: W12, W23</a:t>
-            </a:r>
-          </a:p>
-          <a:p>
-            <a:pPr marL="812800" lvl="1" indent="-342900">
-              <a:spcBef>
-                <a:spcPts val="1200"/>
-              </a:spcBef>
-              <a:buFont typeface="Courier New" panose="02070309020205020404" pitchFamily="49" charset="0"/>
-              <a:buChar char="o"/>
-              <a:tabLst>
-                <a:tab pos="354965" algn="l"/>
-              </a:tabLst>
-            </a:pPr>
-            <a:r>
-              <a:rPr lang="en-IN" sz="1600" spc="-10" dirty="0"/>
-              <a:t>Biases: B12, B23</a:t>
+              <a:t>Weights: W12, W23, Biases: B12, B23</a:t>
             </a:r>
           </a:p>
           <a:p>
@@ -12950,42 +13479,43 @@
                 <a:tab pos="354965" algn="l"/>
               </a:tabLst>
             </a:pPr>
-            <a:endParaRPr lang="en-IN" sz="1800" spc="-10" dirty="0"/>
-          </a:p>
-          <a:p>
-            <a:pPr marL="355600" indent="-342900">
-              <a:spcBef>
-                <a:spcPts val="1200"/>
-              </a:spcBef>
-              <a:buFont typeface="Wingdings" panose="05000000000000000000" pitchFamily="2" charset="2"/>
-              <a:buChar char="§"/>
-              <a:tabLst>
-                <a:tab pos="354965" algn="l"/>
-              </a:tabLst>
-            </a:pPr>
             <a:r>
               <a:rPr lang="en-IN" sz="1800" spc="-10" dirty="0"/>
-              <a:t>These files can be directly used in Verilog.</a:t>
-            </a:r>
-          </a:p>
-          <a:p>
-            <a:pPr marL="355600" indent="-342900">
-              <a:spcBef>
-                <a:spcPts val="1200"/>
-              </a:spcBef>
-              <a:buFont typeface="Wingdings" panose="05000000000000000000" pitchFamily="2" charset="2"/>
-              <a:buChar char="§"/>
-              <a:tabLst>
-                <a:tab pos="354965" algn="l"/>
-              </a:tabLst>
-            </a:pPr>
-            <a:r>
-              <a:rPr lang="en-IN" sz="1800" spc="-10" dirty="0"/>
-              <a:t>And, these files are configurable though global configuration Variables in MATLAB</a:t>
+              <a:t>These files can be directly used in Verilog &amp; are configurable though global configuration Variables in MATLAB</a:t>
             </a:r>
           </a:p>
         </p:txBody>
       </p:sp>
+      <p:pic>
+        <p:nvPicPr>
+          <p:cNvPr id="5" name="Picture 4">
+            <a:extLst>
+              <a:ext uri="{FF2B5EF4-FFF2-40B4-BE49-F238E27FC236}">
+                <a16:creationId xmlns:a16="http://schemas.microsoft.com/office/drawing/2014/main" id="{F8CDC837-E70F-750C-3904-FF50D7F58E7C}"/>
+              </a:ext>
+            </a:extLst>
+          </p:cNvPr>
+          <p:cNvPicPr>
+            <a:picLocks noChangeAspect="1"/>
+          </p:cNvPicPr>
+          <p:nvPr/>
+        </p:nvPicPr>
+        <p:blipFill>
+          <a:blip r:embed="rId2"/>
+          <a:stretch>
+            <a:fillRect/>
+          </a:stretch>
+        </p:blipFill>
+        <p:spPr>
+          <a:xfrm>
+            <a:off x="1709148" y="3538728"/>
+            <a:ext cx="5154283" cy="3105836"/>
+          </a:xfrm>
+          <a:prstGeom prst="rect">
+            <a:avLst/>
+          </a:prstGeom>
+        </p:spPr>
+      </p:pic>
     </p:spTree>
     <p:extLst>
       <p:ext uri="{BB962C8B-B14F-4D97-AF65-F5344CB8AC3E}">
@@ -14003,8 +14533,8 @@
         </p:nvSpPr>
         <p:spPr>
           <a:xfrm>
-            <a:off x="344830" y="1184630"/>
-            <a:ext cx="8328659" cy="900631"/>
+            <a:off x="332042" y="965174"/>
+            <a:ext cx="7513510" cy="5187574"/>
           </a:xfrm>
           <a:prstGeom prst="rect">
             <a:avLst/>
@@ -14023,55 +14553,414 @@
               <a:spcBef>
                 <a:spcPts val="95"/>
               </a:spcBef>
-              <a:buFont typeface="Arial"/>
-              <a:buChar char="•"/>
+              <a:buFont typeface="Wingdings" panose="05000000000000000000" pitchFamily="2" charset="2"/>
+              <a:buChar char="Ø"/>
               <a:tabLst>
                 <a:tab pos="355600" algn="l"/>
               </a:tabLst>
             </a:pPr>
             <a:r>
-              <a:rPr lang="en-IN" sz="2000" dirty="0">
-                <a:latin typeface="Candara"/>
-                <a:cs typeface="Candara"/>
-              </a:rPr>
-              <a:t>HW schematic</a:t>
-            </a:r>
-            <a:r>
-              <a:rPr sz="2000" spc="-40" dirty="0">
-                <a:latin typeface="Candara"/>
-                <a:cs typeface="Candara"/>
-              </a:rPr>
-              <a:t> </a:t>
-            </a:r>
-            <a:r>
-              <a:rPr sz="2000" dirty="0">
-                <a:latin typeface="Candara"/>
-                <a:cs typeface="Candara"/>
-              </a:rPr>
-              <a:t>–</a:t>
-            </a:r>
-            <a:endParaRPr lang="en-IN" sz="2000" dirty="0">
+              <a:rPr lang="en-IN" sz="1200" dirty="0">
+                <a:latin typeface="Candara"/>
+                <a:cs typeface="Candara"/>
+              </a:rPr>
+              <a:t>High-level design comprises of following steps: </a:t>
+            </a:r>
+          </a:p>
+          <a:p>
+            <a:pPr marL="355600" marR="5080" indent="-342900">
+              <a:lnSpc>
+                <a:spcPct val="150100"/>
+              </a:lnSpc>
+              <a:spcBef>
+                <a:spcPts val="95"/>
+              </a:spcBef>
+              <a:buFont typeface="Wingdings" panose="05000000000000000000" pitchFamily="2" charset="2"/>
+              <a:buChar char="q"/>
+              <a:tabLst>
+                <a:tab pos="355600" algn="l"/>
+              </a:tabLst>
+            </a:pPr>
+            <a:r>
+              <a:rPr lang="en-IN" sz="1200" dirty="0">
+                <a:latin typeface="Candara"/>
+                <a:cs typeface="Candara"/>
+              </a:rPr>
+              <a:t>Inputs </a:t>
+            </a:r>
+          </a:p>
+          <a:p>
+            <a:pPr marL="355600" marR="5080" lvl="1" indent="-342900">
+              <a:lnSpc>
+                <a:spcPct val="150100"/>
+              </a:lnSpc>
+              <a:spcBef>
+                <a:spcPts val="95"/>
+              </a:spcBef>
+              <a:buFont typeface="Courier New" panose="02070309020205020404" pitchFamily="49" charset="0"/>
+              <a:buChar char="o"/>
+              <a:tabLst>
+                <a:tab pos="355600" algn="l"/>
+              </a:tabLst>
+            </a:pPr>
+            <a:r>
+              <a:rPr lang="en-IN" sz="1200" dirty="0" err="1">
+                <a:latin typeface="Candara"/>
+                <a:cs typeface="Candara"/>
+              </a:rPr>
+              <a:t>clk</a:t>
+            </a:r>
+            <a:r>
+              <a:rPr lang="en-IN" sz="1200" dirty="0">
+                <a:latin typeface="Candara"/>
+                <a:cs typeface="Candara"/>
+              </a:rPr>
+              <a:t> (positive edge-triggered CLOCK) </a:t>
+            </a:r>
+          </a:p>
+          <a:p>
+            <a:pPr marL="355600" marR="5080" lvl="1" indent="-342900">
+              <a:lnSpc>
+                <a:spcPct val="150100"/>
+              </a:lnSpc>
+              <a:spcBef>
+                <a:spcPts val="95"/>
+              </a:spcBef>
+              <a:buFont typeface="Courier New" panose="02070309020205020404" pitchFamily="49" charset="0"/>
+              <a:buChar char="o"/>
+              <a:tabLst>
+                <a:tab pos="355600" algn="l"/>
+              </a:tabLst>
+            </a:pPr>
+            <a:r>
+              <a:rPr lang="en-IN" sz="1200" dirty="0" err="1">
+                <a:latin typeface="Candara"/>
+                <a:cs typeface="Candara"/>
+              </a:rPr>
+              <a:t>rst</a:t>
+            </a:r>
+            <a:r>
+              <a:rPr lang="en-IN" sz="1200" dirty="0">
+                <a:latin typeface="Candara"/>
+                <a:cs typeface="Candara"/>
+              </a:rPr>
+              <a:t> (positive edge-triggered RESET) </a:t>
+            </a:r>
+          </a:p>
+          <a:p>
+            <a:pPr marL="355600" marR="5080" lvl="1" indent="-342900">
+              <a:lnSpc>
+                <a:spcPct val="150100"/>
+              </a:lnSpc>
+              <a:spcBef>
+                <a:spcPts val="95"/>
+              </a:spcBef>
+              <a:buFont typeface="Courier New" panose="02070309020205020404" pitchFamily="49" charset="0"/>
+              <a:buChar char="o"/>
+              <a:tabLst>
+                <a:tab pos="355600" algn="l"/>
+              </a:tabLst>
+            </a:pPr>
+            <a:r>
+              <a:rPr lang="en-IN" sz="1200" dirty="0">
+                <a:latin typeface="Candara"/>
+                <a:cs typeface="Candara"/>
+              </a:rPr>
+              <a:t>start (positive edge-triggered to START inference) </a:t>
+            </a:r>
+          </a:p>
+          <a:p>
+            <a:pPr marL="355600" marR="5080" lvl="1" indent="-342900">
+              <a:lnSpc>
+                <a:spcPct val="150100"/>
+              </a:lnSpc>
+              <a:spcBef>
+                <a:spcPts val="95"/>
+              </a:spcBef>
+              <a:buFont typeface="Courier New" panose="02070309020205020404" pitchFamily="49" charset="0"/>
+              <a:buChar char="o"/>
+              <a:tabLst>
+                <a:tab pos="355600" algn="l"/>
+              </a:tabLst>
+            </a:pPr>
+            <a:r>
+              <a:rPr lang="en-IN" sz="1200" dirty="0" err="1">
+                <a:latin typeface="Candara"/>
+                <a:cs typeface="Candara"/>
+              </a:rPr>
+              <a:t>Test_img</a:t>
+            </a:r>
+            <a:r>
+              <a:rPr lang="en-IN" sz="1200" dirty="0">
+                <a:latin typeface="Candara"/>
+                <a:cs typeface="Candara"/>
+              </a:rPr>
+              <a:t> (256 bits test image 16x16 pixels) </a:t>
+            </a:r>
+          </a:p>
+          <a:p>
+            <a:pPr marL="355600" marR="5080" indent="-342900">
+              <a:lnSpc>
+                <a:spcPct val="150100"/>
+              </a:lnSpc>
+              <a:spcBef>
+                <a:spcPts val="95"/>
+              </a:spcBef>
+              <a:buFont typeface="Wingdings" panose="05000000000000000000" pitchFamily="2" charset="2"/>
+              <a:buChar char="q"/>
+              <a:tabLst>
+                <a:tab pos="355600" algn="l"/>
+              </a:tabLst>
+            </a:pPr>
+            <a:r>
+              <a:rPr lang="en-IN" sz="1200" dirty="0">
+                <a:latin typeface="Candara"/>
+                <a:cs typeface="Candara"/>
+              </a:rPr>
+              <a:t>Outputs </a:t>
+            </a:r>
+          </a:p>
+          <a:p>
+            <a:pPr marL="355600" marR="5080" indent="-342900">
+              <a:lnSpc>
+                <a:spcPct val="150100"/>
+              </a:lnSpc>
+              <a:spcBef>
+                <a:spcPts val="95"/>
+              </a:spcBef>
+              <a:buFont typeface="Courier New" panose="02070309020205020404" pitchFamily="49" charset="0"/>
+              <a:buChar char="o"/>
+              <a:tabLst>
+                <a:tab pos="355600" algn="l"/>
+              </a:tabLst>
+            </a:pPr>
+            <a:r>
+              <a:rPr lang="en-IN" sz="1200" dirty="0">
+                <a:latin typeface="Candara"/>
+                <a:cs typeface="Candara"/>
+              </a:rPr>
+              <a:t>done (1 bit to signal inference is DONE) </a:t>
+            </a:r>
+          </a:p>
+          <a:p>
+            <a:pPr marL="355600" marR="5080" indent="-342900">
+              <a:lnSpc>
+                <a:spcPct val="150100"/>
+              </a:lnSpc>
+              <a:spcBef>
+                <a:spcPts val="95"/>
+              </a:spcBef>
+              <a:buFont typeface="Courier New" panose="02070309020205020404" pitchFamily="49" charset="0"/>
+              <a:buChar char="o"/>
+              <a:tabLst>
+                <a:tab pos="355600" algn="l"/>
+              </a:tabLst>
+            </a:pPr>
+            <a:r>
+              <a:rPr lang="en-IN" sz="1200" dirty="0" err="1">
+                <a:latin typeface="Candara"/>
+                <a:cs typeface="Candara"/>
+              </a:rPr>
+              <a:t>predicted_val</a:t>
+            </a:r>
+            <a:r>
+              <a:rPr lang="en-IN" sz="1200" dirty="0">
+                <a:latin typeface="Candara"/>
+                <a:cs typeface="Candara"/>
+              </a:rPr>
+              <a:t> (The digit predicted in [0-3] bits range 0 to 9 corresponding to the digit value) </a:t>
+            </a:r>
+          </a:p>
+          <a:p>
+            <a:pPr marL="355600" marR="5080" indent="-342900">
+              <a:lnSpc>
+                <a:spcPct val="150100"/>
+              </a:lnSpc>
+              <a:spcBef>
+                <a:spcPts val="95"/>
+              </a:spcBef>
+              <a:buFont typeface="Wingdings" panose="05000000000000000000" pitchFamily="2" charset="2"/>
+              <a:buChar char="q"/>
+              <a:tabLst>
+                <a:tab pos="355600" algn="l"/>
+              </a:tabLst>
+            </a:pPr>
+            <a:r>
+              <a:rPr lang="en-IN" sz="1200" dirty="0">
+                <a:latin typeface="Candara"/>
+              </a:rPr>
+              <a:t>States of operation</a:t>
+            </a:r>
+          </a:p>
+          <a:p>
+            <a:pPr marL="355600" marR="5080" indent="-342900">
+              <a:lnSpc>
+                <a:spcPct val="150100"/>
+              </a:lnSpc>
+              <a:spcBef>
+                <a:spcPts val="95"/>
+              </a:spcBef>
+              <a:buFont typeface="Courier New" panose="02070309020205020404" pitchFamily="49" charset="0"/>
+              <a:buChar char="o"/>
+              <a:tabLst>
+                <a:tab pos="355600" algn="l"/>
+              </a:tabLst>
+            </a:pPr>
+            <a:r>
+              <a:rPr lang="en-IN" sz="1200" dirty="0">
+                <a:latin typeface="Candara"/>
+              </a:rPr>
+              <a:t>Matrix multiply hidden layer weights (w12 x a1 i.e. Matrix Multiplication  [40 x 256] * [256 x 1]) </a:t>
+            </a:r>
+          </a:p>
+          <a:p>
+            <a:pPr marL="355600" marR="5080" indent="-342900">
+              <a:lnSpc>
+                <a:spcPct val="150100"/>
+              </a:lnSpc>
+              <a:spcBef>
+                <a:spcPts val="95"/>
+              </a:spcBef>
+              <a:buFont typeface="Courier New" panose="02070309020205020404" pitchFamily="49" charset="0"/>
+              <a:buChar char="o"/>
+              <a:tabLst>
+                <a:tab pos="355600" algn="l"/>
+              </a:tabLst>
+            </a:pPr>
+            <a:r>
+              <a:rPr lang="en-IN" sz="1200" dirty="0">
+                <a:latin typeface="Candara"/>
+              </a:rPr>
+              <a:t>Bias add hidden weights (z2 = w12 x a1 +b12 i.e. Matrix addition 40 x 1) </a:t>
+            </a:r>
+          </a:p>
+          <a:p>
+            <a:pPr marL="355600" marR="5080" indent="-342900">
+              <a:lnSpc>
+                <a:spcPct val="150100"/>
+              </a:lnSpc>
+              <a:spcBef>
+                <a:spcPts val="95"/>
+              </a:spcBef>
+              <a:buFont typeface="Courier New" panose="02070309020205020404" pitchFamily="49" charset="0"/>
+              <a:buChar char="o"/>
+              <a:tabLst>
+                <a:tab pos="355600" algn="l"/>
+              </a:tabLst>
+            </a:pPr>
+            <a:r>
+              <a:rPr lang="en-IN" sz="1200" dirty="0">
+                <a:latin typeface="Candara"/>
+              </a:rPr>
+              <a:t>Leaky RELU (On z2 = a2 i.e. 40 x 1)</a:t>
+            </a:r>
+          </a:p>
+          <a:p>
+            <a:pPr marL="355600" marR="5080" indent="-342900">
+              <a:lnSpc>
+                <a:spcPct val="150100"/>
+              </a:lnSpc>
+              <a:spcBef>
+                <a:spcPts val="95"/>
+              </a:spcBef>
+              <a:buFont typeface="Courier New" panose="02070309020205020404" pitchFamily="49" charset="0"/>
+              <a:buChar char="o"/>
+              <a:tabLst>
+                <a:tab pos="355600" algn="l"/>
+              </a:tabLst>
+            </a:pPr>
+            <a:r>
+              <a:rPr lang="en-IN" sz="1200" dirty="0">
+                <a:latin typeface="Candara"/>
+              </a:rPr>
+              <a:t>Matrix multiply output layer weights (w23 x a2 i.e. Matrix Multiplication  [10 x 40] * [40 x 1]) </a:t>
+            </a:r>
+          </a:p>
+          <a:p>
+            <a:pPr marL="355600" marR="5080" indent="-342900">
+              <a:lnSpc>
+                <a:spcPct val="150100"/>
+              </a:lnSpc>
+              <a:spcBef>
+                <a:spcPts val="95"/>
+              </a:spcBef>
+              <a:buFont typeface="Courier New" panose="02070309020205020404" pitchFamily="49" charset="0"/>
+              <a:buChar char="o"/>
+              <a:tabLst>
+                <a:tab pos="355600" algn="l"/>
+              </a:tabLst>
+            </a:pPr>
+            <a:r>
+              <a:rPr lang="en-IN" sz="1200" dirty="0">
+                <a:latin typeface="Candara"/>
+              </a:rPr>
+              <a:t>Bias add final layer weights (z3 = w23 x a2 +b23 10 x 1 i.e. Matrix addition 10 x 1) </a:t>
+            </a:r>
+          </a:p>
+          <a:p>
+            <a:pPr marL="355600" marR="5080" indent="-342900">
+              <a:lnSpc>
+                <a:spcPct val="150100"/>
+              </a:lnSpc>
+              <a:spcBef>
+                <a:spcPts val="95"/>
+              </a:spcBef>
+              <a:buFont typeface="Courier New" panose="02070309020205020404" pitchFamily="49" charset="0"/>
+              <a:buChar char="o"/>
+              <a:tabLst>
+                <a:tab pos="355600" algn="l"/>
+              </a:tabLst>
+            </a:pPr>
+            <a:r>
+              <a:rPr lang="en-IN" sz="1200" dirty="0">
+                <a:latin typeface="Candara"/>
+              </a:rPr>
+              <a:t>Leaky RELU (On z2 = a3 i.e. 10 x 1)</a:t>
+            </a:r>
+          </a:p>
+          <a:p>
+            <a:pPr marL="355600" marR="5080" indent="-342900">
+              <a:lnSpc>
+                <a:spcPct val="150100"/>
+              </a:lnSpc>
+              <a:spcBef>
+                <a:spcPts val="95"/>
+              </a:spcBef>
+              <a:buFont typeface="Courier New" panose="02070309020205020404" pitchFamily="49" charset="0"/>
+              <a:buChar char="o"/>
+              <a:tabLst>
+                <a:tab pos="355600" algn="l"/>
+              </a:tabLst>
+            </a:pPr>
+            <a:r>
+              <a:rPr lang="en-IN" sz="1200" dirty="0">
+                <a:latin typeface="Candara"/>
+              </a:rPr>
+              <a:t>Find Max of a3 to predict the image (The digit in [0-3] bits range 0 to 9 range.</a:t>
+            </a:r>
+          </a:p>
+          <a:p>
+            <a:pPr marL="355600" marR="5080" indent="-342900">
+              <a:lnSpc>
+                <a:spcPct val="150100"/>
+              </a:lnSpc>
+              <a:spcBef>
+                <a:spcPts val="95"/>
+              </a:spcBef>
+              <a:buFont typeface="Courier New" panose="02070309020205020404" pitchFamily="49" charset="0"/>
+              <a:buChar char="o"/>
+              <a:tabLst>
+                <a:tab pos="355600" algn="l"/>
+              </a:tabLst>
+            </a:pPr>
+            <a:r>
+              <a:rPr lang="en-IN" sz="1200" dirty="0">
+                <a:latin typeface="Candara"/>
+              </a:rPr>
+              <a:t>done bit (signals end of inference is complete)</a:t>
+            </a:r>
+            <a:endParaRPr sz="1200" dirty="0">
               <a:latin typeface="Candara"/>
-              <a:cs typeface="Candara"/>
-            </a:endParaRPr>
-          </a:p>
-          <a:p>
-            <a:pPr marL="355600" marR="5080" indent="-342900">
-              <a:lnSpc>
-                <a:spcPct val="150100"/>
-              </a:lnSpc>
-              <a:spcBef>
-                <a:spcPts val="95"/>
-              </a:spcBef>
-              <a:buFont typeface="Arial"/>
-              <a:buChar char="•"/>
-              <a:tabLst>
-                <a:tab pos="355600" algn="l"/>
-              </a:tabLst>
-            </a:pPr>
-            <a:endParaRPr sz="2000" dirty="0">
-              <a:latin typeface="Candara"/>
-              <a:cs typeface="Candara"/>
             </a:endParaRPr>
           </a:p>
         </p:txBody>
@@ -14365,4 +15254,299 @@
   <a:objectDefaults/>
   <a:extraClrSchemeLst/>
 </a:theme>
+</file>
+
+<file path=ppt/theme/theme2.xml><?xml version="1.0" encoding="utf-8"?>
+<a:theme xmlns:a="http://schemas.openxmlformats.org/drawingml/2006/main" name="Office Theme">
+  <a:themeElements>
+    <a:clrScheme name="Office">
+      <a:dk1>
+        <a:sysClr val="windowText" lastClr="000000"/>
+      </a:dk1>
+      <a:lt1>
+        <a:sysClr val="window" lastClr="FFFFFF"/>
+      </a:lt1>
+      <a:dk2>
+        <a:srgbClr val="44546A"/>
+      </a:dk2>
+      <a:lt2>
+        <a:srgbClr val="E7E6E6"/>
+      </a:lt2>
+      <a:accent1>
+        <a:srgbClr val="4472C4"/>
+      </a:accent1>
+      <a:accent2>
+        <a:srgbClr val="ED7D31"/>
+      </a:accent2>
+      <a:accent3>
+        <a:srgbClr val="A5A5A5"/>
+      </a:accent3>
+      <a:accent4>
+        <a:srgbClr val="FFC000"/>
+      </a:accent4>
+      <a:accent5>
+        <a:srgbClr val="5B9BD5"/>
+      </a:accent5>
+      <a:accent6>
+        <a:srgbClr val="70AD47"/>
+      </a:accent6>
+      <a:hlink>
+        <a:srgbClr val="0563C1"/>
+      </a:hlink>
+      <a:folHlink>
+        <a:srgbClr val="954F72"/>
+      </a:folHlink>
+    </a:clrScheme>
+    <a:fontScheme name="Office">
+      <a:majorFont>
+        <a:latin typeface="Calibri Light" panose="020F0302020204030204"/>
+        <a:ea typeface=""/>
+        <a:cs typeface=""/>
+        <a:font script="Jpan" typeface="游ゴシック Light"/>
+        <a:font script="Hang" typeface="맑은 고딕"/>
+        <a:font script="Hans" typeface="等线 Light"/>
+        <a:font script="Hant" typeface="新細明體"/>
+        <a:font script="Arab" typeface="Times New Roman"/>
+        <a:font script="Hebr" typeface="Times New Roman"/>
+        <a:font script="Thai" typeface="Angsana New"/>
+        <a:font script="Ethi" typeface="Nyala"/>
+        <a:font script="Beng" typeface="Vrinda"/>
+        <a:font script="Gujr" typeface="Shruti"/>
+        <a:font script="Khmr" typeface="MoolBoran"/>
+        <a:font script="Knda" typeface="Tunga"/>
+        <a:font script="Guru" typeface="Raavi"/>
+        <a:font script="Cans" typeface="Euphemia"/>
+        <a:font script="Cher" typeface="Plantagenet Cherokee"/>
+        <a:font script="Yiii" typeface="Microsoft Yi Baiti"/>
+        <a:font script="Tibt" typeface="Microsoft Himalaya"/>
+        <a:font script="Thaa" typeface="MV Boli"/>
+        <a:font script="Deva" typeface="Mangal"/>
+        <a:font script="Telu" typeface="Gautami"/>
+        <a:font script="Taml" typeface="Latha"/>
+        <a:font script="Syrc" typeface="Estrangelo Edessa"/>
+        <a:font script="Orya" typeface="Kalinga"/>
+        <a:font script="Mlym" typeface="Kartika"/>
+        <a:font script="Laoo" typeface="DokChampa"/>
+        <a:font script="Sinh" typeface="Iskoola Pota"/>
+        <a:font script="Mong" typeface="Mongolian Baiti"/>
+        <a:font script="Viet" typeface="Times New Roman"/>
+        <a:font script="Uigh" typeface="Microsoft Uighur"/>
+        <a:font script="Geor" typeface="Sylfaen"/>
+        <a:font script="Armn" typeface="Arial"/>
+        <a:font script="Bugi" typeface="Leelawadee UI"/>
+        <a:font script="Bopo" typeface="Microsoft JhengHei"/>
+        <a:font script="Java" typeface="Javanese Text"/>
+        <a:font script="Lisu" typeface="Segoe UI"/>
+        <a:font script="Mymr" typeface="Myanmar Text"/>
+        <a:font script="Nkoo" typeface="Ebrima"/>
+        <a:font script="Olck" typeface="Nirmala UI"/>
+        <a:font script="Osma" typeface="Ebrima"/>
+        <a:font script="Phag" typeface="Phagspa"/>
+        <a:font script="Syrn" typeface="Estrangelo Edessa"/>
+        <a:font script="Syrj" typeface="Estrangelo Edessa"/>
+        <a:font script="Syre" typeface="Estrangelo Edessa"/>
+        <a:font script="Sora" typeface="Nirmala UI"/>
+        <a:font script="Tale" typeface="Microsoft Tai Le"/>
+        <a:font script="Talu" typeface="Microsoft New Tai Lue"/>
+        <a:font script="Tfng" typeface="Ebrima"/>
+      </a:majorFont>
+      <a:minorFont>
+        <a:latin typeface="Calibri" panose="020F0502020204030204"/>
+        <a:ea typeface=""/>
+        <a:cs typeface=""/>
+        <a:font script="Jpan" typeface="游ゴシック"/>
+        <a:font script="Hang" typeface="맑은 고딕"/>
+        <a:font script="Hans" typeface="等线"/>
+        <a:font script="Hant" typeface="新細明體"/>
+        <a:font script="Arab" typeface="Arial"/>
+        <a:font script="Hebr" typeface="Arial"/>
+        <a:font script="Thai" typeface="Cordia New"/>
+        <a:font script="Ethi" typeface="Nyala"/>
+        <a:font script="Beng" typeface="Vrinda"/>
+        <a:font script="Gujr" typeface="Shruti"/>
+        <a:font script="Khmr" typeface="DaunPenh"/>
+        <a:font script="Knda" typeface="Tunga"/>
+        <a:font script="Guru" typeface="Raavi"/>
+        <a:font script="Cans" typeface="Euphemia"/>
+        <a:font script="Cher" typeface="Plantagenet Cherokee"/>
+        <a:font script="Yiii" typeface="Microsoft Yi Baiti"/>
+        <a:font script="Tibt" typeface="Microsoft Himalaya"/>
+        <a:font script="Thaa" typeface="MV Boli"/>
+        <a:font script="Deva" typeface="Mangal"/>
+        <a:font script="Telu" typeface="Gautami"/>
+        <a:font script="Taml" typeface="Latha"/>
+        <a:font script="Syrc" typeface="Estrangelo Edessa"/>
+        <a:font script="Orya" typeface="Kalinga"/>
+        <a:font script="Mlym" typeface="Kartika"/>
+        <a:font script="Laoo" typeface="DokChampa"/>
+        <a:font script="Sinh" typeface="Iskoola Pota"/>
+        <a:font script="Mong" typeface="Mongolian Baiti"/>
+        <a:font script="Viet" typeface="Arial"/>
+        <a:font script="Uigh" typeface="Microsoft Uighur"/>
+        <a:font script="Geor" typeface="Sylfaen"/>
+        <a:font script="Armn" typeface="Arial"/>
+        <a:font script="Bugi" typeface="Leelawadee UI"/>
+        <a:font script="Bopo" typeface="Microsoft JhengHei"/>
+        <a:font script="Java" typeface="Javanese Text"/>
+        <a:font script="Lisu" typeface="Segoe UI"/>
+        <a:font script="Mymr" typeface="Myanmar Text"/>
+        <a:font script="Nkoo" typeface="Ebrima"/>
+        <a:font script="Olck" typeface="Nirmala UI"/>
+        <a:font script="Osma" typeface="Ebrima"/>
+        <a:font script="Phag" typeface="Phagspa"/>
+        <a:font script="Syrn" typeface="Estrangelo Edessa"/>
+        <a:font script="Syrj" typeface="Estrangelo Edessa"/>
+        <a:font script="Syre" typeface="Estrangelo Edessa"/>
+        <a:font script="Sora" typeface="Nirmala UI"/>
+        <a:font script="Tale" typeface="Microsoft Tai Le"/>
+        <a:font script="Talu" typeface="Microsoft New Tai Lue"/>
+        <a:font script="Tfng" typeface="Ebrima"/>
+      </a:minorFont>
+    </a:fontScheme>
+    <a:fmtScheme name="Office">
+      <a:fillStyleLst>
+        <a:solidFill>
+          <a:schemeClr val="phClr"/>
+        </a:solidFill>
+        <a:gradFill rotWithShape="1">
+          <a:gsLst>
+            <a:gs pos="0">
+              <a:schemeClr val="phClr">
+                <a:lumMod val="110000"/>
+                <a:satMod val="105000"/>
+                <a:tint val="67000"/>
+              </a:schemeClr>
+            </a:gs>
+            <a:gs pos="50000">
+              <a:schemeClr val="phClr">
+                <a:lumMod val="105000"/>
+                <a:satMod val="103000"/>
+                <a:tint val="73000"/>
+              </a:schemeClr>
+            </a:gs>
+            <a:gs pos="100000">
+              <a:schemeClr val="phClr">
+                <a:lumMod val="105000"/>
+                <a:satMod val="109000"/>
+                <a:tint val="81000"/>
+              </a:schemeClr>
+            </a:gs>
+          </a:gsLst>
+          <a:lin ang="5400000" scaled="0"/>
+        </a:gradFill>
+        <a:gradFill rotWithShape="1">
+          <a:gsLst>
+            <a:gs pos="0">
+              <a:schemeClr val="phClr">
+                <a:satMod val="103000"/>
+                <a:lumMod val="102000"/>
+                <a:tint val="94000"/>
+              </a:schemeClr>
+            </a:gs>
+            <a:gs pos="50000">
+              <a:schemeClr val="phClr">
+                <a:satMod val="110000"/>
+                <a:lumMod val="100000"/>
+                <a:shade val="100000"/>
+              </a:schemeClr>
+            </a:gs>
+            <a:gs pos="100000">
+              <a:schemeClr val="phClr">
+                <a:lumMod val="99000"/>
+                <a:satMod val="120000"/>
+                <a:shade val="78000"/>
+              </a:schemeClr>
+            </a:gs>
+          </a:gsLst>
+          <a:lin ang="5400000" scaled="0"/>
+        </a:gradFill>
+      </a:fillStyleLst>
+      <a:lnStyleLst>
+        <a:ln w="6350" cap="flat" cmpd="sng" algn="ctr">
+          <a:solidFill>
+            <a:schemeClr val="phClr"/>
+          </a:solidFill>
+          <a:prstDash val="solid"/>
+          <a:miter lim="800000"/>
+        </a:ln>
+        <a:ln w="12700" cap="flat" cmpd="sng" algn="ctr">
+          <a:solidFill>
+            <a:schemeClr val="phClr"/>
+          </a:solidFill>
+          <a:prstDash val="solid"/>
+          <a:miter lim="800000"/>
+        </a:ln>
+        <a:ln w="19050" cap="flat" cmpd="sng" algn="ctr">
+          <a:solidFill>
+            <a:schemeClr val="phClr"/>
+          </a:solidFill>
+          <a:prstDash val="solid"/>
+          <a:miter lim="800000"/>
+        </a:ln>
+      </a:lnStyleLst>
+      <a:effectStyleLst>
+        <a:effectStyle>
+          <a:effectLst/>
+        </a:effectStyle>
+        <a:effectStyle>
+          <a:effectLst/>
+        </a:effectStyle>
+        <a:effectStyle>
+          <a:effectLst>
+            <a:outerShdw blurRad="57150" dist="19050" dir="5400000" algn="ctr" rotWithShape="0">
+              <a:srgbClr val="000000">
+                <a:alpha val="63000"/>
+              </a:srgbClr>
+            </a:outerShdw>
+          </a:effectLst>
+        </a:effectStyle>
+      </a:effectStyleLst>
+      <a:bgFillStyleLst>
+        <a:solidFill>
+          <a:schemeClr val="phClr"/>
+        </a:solidFill>
+        <a:solidFill>
+          <a:schemeClr val="phClr">
+            <a:tint val="95000"/>
+            <a:satMod val="170000"/>
+          </a:schemeClr>
+        </a:solidFill>
+        <a:gradFill rotWithShape="1">
+          <a:gsLst>
+            <a:gs pos="0">
+              <a:schemeClr val="phClr">
+                <a:tint val="93000"/>
+                <a:satMod val="150000"/>
+                <a:shade val="98000"/>
+                <a:lumMod val="102000"/>
+              </a:schemeClr>
+            </a:gs>
+            <a:gs pos="50000">
+              <a:schemeClr val="phClr">
+                <a:tint val="98000"/>
+                <a:satMod val="130000"/>
+                <a:shade val="90000"/>
+                <a:lumMod val="103000"/>
+              </a:schemeClr>
+            </a:gs>
+            <a:gs pos="100000">
+              <a:schemeClr val="phClr">
+                <a:shade val="63000"/>
+                <a:satMod val="120000"/>
+              </a:schemeClr>
+            </a:gs>
+          </a:gsLst>
+          <a:lin ang="5400000" scaled="0"/>
+        </a:gradFill>
+      </a:bgFillStyleLst>
+    </a:fmtScheme>
+  </a:themeElements>
+  <a:objectDefaults/>
+  <a:extraClrSchemeLst/>
+  <a:extLst>
+    <a:ext uri="{05A4C25C-085E-4340-85A3-A5531E510DB2}">
+      <thm15:themeFamily xmlns:thm15="http://schemas.microsoft.com/office/thememl/2012/main" name="Office Theme" id="{62F939B6-93AF-4DB8-9C6B-D6C7DFDC589F}" vid="{4A3C46E8-61CC-4603-A589-7422A47A8E4A}"/>
+    </a:ext>
+  </a:extLst>
+</a:theme>
 </file>
</xml_diff>

<commit_message>
Fixed the simulation issue.
</commit_message>
<xml_diff>
--- a/Project_Report/ASIC for Neural Network inference_P_V_Rajesh_Kumar.pptx
+++ b/Project_Report/ASIC for Neural Network inference_P_V_Rajesh_Kumar.pptx
@@ -5225,10 +5225,10 @@
       </p:sp>
       <p:pic>
         <p:nvPicPr>
-          <p:cNvPr id="7" name="Picture 6">
+          <p:cNvPr id="8" name="Picture 7">
             <a:extLst>
               <a:ext uri="{FF2B5EF4-FFF2-40B4-BE49-F238E27FC236}">
-                <a16:creationId xmlns:a16="http://schemas.microsoft.com/office/drawing/2014/main" id="{3B4EC051-99DA-A1E6-7DE9-8DF909DCC746}"/>
+                <a16:creationId xmlns:a16="http://schemas.microsoft.com/office/drawing/2014/main" id="{01D75C68-2420-072E-C7A5-A36F363A7D48}"/>
               </a:ext>
             </a:extLst>
           </p:cNvPr>
@@ -5245,8 +5245,8 @@
         </p:blipFill>
         <p:spPr>
           <a:xfrm>
-            <a:off x="134683" y="3293925"/>
-            <a:ext cx="8723376" cy="3259884"/>
+            <a:off x="342327" y="3144130"/>
+            <a:ext cx="8010144" cy="3524463"/>
           </a:xfrm>
           <a:prstGeom prst="rect">
             <a:avLst/>

</xml_diff>

<commit_message>
Updated with Post-Synthesis details.
</commit_message>
<xml_diff>
--- a/Project_Report/ASIC for Neural Network inference_P_V_Rajesh_Kumar.pptx
+++ b/Project_Report/ASIC for Neural Network inference_P_V_Rajesh_Kumar.pptx
@@ -4645,7 +4645,7 @@
         </p:nvSpPr>
         <p:spPr>
           <a:xfrm>
-            <a:off x="308254" y="943483"/>
+            <a:off x="316880" y="856706"/>
             <a:ext cx="5640705" cy="641842"/>
           </a:xfrm>
           <a:prstGeom prst="rect">
@@ -4781,10 +4781,10 @@
       </p:sp>
       <p:pic>
         <p:nvPicPr>
-          <p:cNvPr id="7" name="Picture 6">
+          <p:cNvPr id="8" name="Picture 7">
             <a:extLst>
               <a:ext uri="{FF2B5EF4-FFF2-40B4-BE49-F238E27FC236}">
-                <a16:creationId xmlns:a16="http://schemas.microsoft.com/office/drawing/2014/main" id="{E4AFE34A-4897-07F4-E981-1BB3CB2B85D5}"/>
+                <a16:creationId xmlns:a16="http://schemas.microsoft.com/office/drawing/2014/main" id="{84C44FB8-389A-0A2A-8EE0-6114D837C50A}"/>
               </a:ext>
             </a:extLst>
           </p:cNvPr>
@@ -4801,8 +4801,8 @@
         </p:blipFill>
         <p:spPr>
           <a:xfrm>
-            <a:off x="1590880" y="1264404"/>
-            <a:ext cx="5640705" cy="5330057"/>
+            <a:off x="1701778" y="1190477"/>
+            <a:ext cx="5740441" cy="5363332"/>
           </a:xfrm>
           <a:prstGeom prst="rect">
             <a:avLst/>

</xml_diff>

<commit_message>
Updated with LEC Reports.
</commit_message>
<xml_diff>
--- a/Project_Report/ASIC for Neural Network inference_P_V_Rajesh_Kumar.pptx
+++ b/Project_Report/ASIC for Neural Network inference_P_V_Rajesh_Kumar.pptx
@@ -6376,7 +6376,7 @@
                 <a:latin typeface="Candara"/>
                 <a:cs typeface="Candara"/>
               </a:rPr>
-              <a:t>Got stuck at Gate Level Simulation.</a:t>
+              <a:t>Got stuck at LEC.</a:t>
             </a:r>
             <a:endParaRPr sz="2000" dirty="0">
               <a:highlight>
@@ -6938,195 +6938,6 @@
       </p:sp>
       <p:graphicFrame>
         <p:nvGraphicFramePr>
-          <p:cNvPr id="10" name="Object 9">
-            <a:extLst>
-              <a:ext uri="{FF2B5EF4-FFF2-40B4-BE49-F238E27FC236}">
-                <a16:creationId xmlns:a16="http://schemas.microsoft.com/office/drawing/2014/main" id="{4D6B58BD-B090-0360-B528-0DE0B5DC402F}"/>
-              </a:ext>
-            </a:extLst>
-          </p:cNvPr>
-          <p:cNvGraphicFramePr>
-            <a:graphicFrameLocks noChangeAspect="1"/>
-          </p:cNvGraphicFramePr>
-          <p:nvPr>
-            <p:extLst>
-              <p:ext uri="{D42A27DB-BD31-4B8C-83A1-F6EECF244321}">
-                <p14:modId xmlns:p14="http://schemas.microsoft.com/office/powerpoint/2010/main" val="279034129"/>
-              </p:ext>
-            </p:extLst>
-          </p:nvPr>
-        </p:nvGraphicFramePr>
-        <p:xfrm>
-          <a:off x="1016000" y="2057400"/>
-          <a:ext cx="771525" cy="514350"/>
-        </p:xfrm>
-        <a:graphic>
-          <a:graphicData uri="http://schemas.openxmlformats.org/presentationml/2006/ole">
-            <mc:AlternateContent xmlns:mc="http://schemas.openxmlformats.org/markup-compatibility/2006">
-              <mc:Choice xmlns:v="urn:schemas-microsoft-com:vml" Requires="v">
-                <p:oleObj name="Packager Shell Object" showAsIcon="1" r:id="rId2" imgW="771401" imgH="514350" progId="Package">
-                  <p:embed/>
-                </p:oleObj>
-              </mc:Choice>
-              <mc:Fallback>
-                <p:oleObj name="Packager Shell Object" showAsIcon="1" r:id="rId2" imgW="771401" imgH="514350" progId="Package">
-                  <p:embed/>
-                  <p:pic>
-                    <p:nvPicPr>
-                      <p:cNvPr id="0" name=""/>
-                      <p:cNvPicPr/>
-                      <p:nvPr/>
-                    </p:nvPicPr>
-                    <p:blipFill>
-                      <a:blip r:embed="rId3"/>
-                      <a:stretch>
-                        <a:fillRect/>
-                      </a:stretch>
-                    </p:blipFill>
-                    <p:spPr>
-                      <a:xfrm>
-                        <a:off x="1016000" y="2057400"/>
-                        <a:ext cx="771525" cy="514350"/>
-                      </a:xfrm>
-                      <a:prstGeom prst="rect">
-                        <a:avLst/>
-                      </a:prstGeom>
-                    </p:spPr>
-                  </p:pic>
-                </p:oleObj>
-              </mc:Fallback>
-            </mc:AlternateContent>
-          </a:graphicData>
-        </a:graphic>
-      </p:graphicFrame>
-      <p:graphicFrame>
-        <p:nvGraphicFramePr>
-          <p:cNvPr id="13" name="Object 12">
-            <a:extLst>
-              <a:ext uri="{FF2B5EF4-FFF2-40B4-BE49-F238E27FC236}">
-                <a16:creationId xmlns:a16="http://schemas.microsoft.com/office/drawing/2014/main" id="{E6AB7B6E-E8F9-BA72-98CB-165C78C67F21}"/>
-              </a:ext>
-            </a:extLst>
-          </p:cNvPr>
-          <p:cNvGraphicFramePr>
-            <a:graphicFrameLocks noChangeAspect="1"/>
-          </p:cNvGraphicFramePr>
-          <p:nvPr>
-            <p:extLst>
-              <p:ext uri="{D42A27DB-BD31-4B8C-83A1-F6EECF244321}">
-                <p14:modId xmlns:p14="http://schemas.microsoft.com/office/powerpoint/2010/main" val="3758002748"/>
-              </p:ext>
-            </p:extLst>
-          </p:nvPr>
-        </p:nvGraphicFramePr>
-        <p:xfrm>
-          <a:off x="1840255" y="2027336"/>
-          <a:ext cx="438150" cy="514350"/>
-        </p:xfrm>
-        <a:graphic>
-          <a:graphicData uri="http://schemas.openxmlformats.org/presentationml/2006/ole">
-            <mc:AlternateContent xmlns:mc="http://schemas.openxmlformats.org/markup-compatibility/2006">
-              <mc:Choice xmlns:v="urn:schemas-microsoft-com:vml" Requires="v">
-                <p:oleObj name="Packager Shell Object" showAsIcon="1" r:id="rId4" imgW="437978" imgH="514350" progId="Package">
-                  <p:embed/>
-                </p:oleObj>
-              </mc:Choice>
-              <mc:Fallback>
-                <p:oleObj name="Packager Shell Object" showAsIcon="1" r:id="rId4" imgW="437978" imgH="514350" progId="Package">
-                  <p:embed/>
-                  <p:pic>
-                    <p:nvPicPr>
-                      <p:cNvPr id="0" name=""/>
-                      <p:cNvPicPr/>
-                      <p:nvPr/>
-                    </p:nvPicPr>
-                    <p:blipFill>
-                      <a:blip r:embed="rId5"/>
-                      <a:stretch>
-                        <a:fillRect/>
-                      </a:stretch>
-                    </p:blipFill>
-                    <p:spPr>
-                      <a:xfrm>
-                        <a:off x="1840255" y="2027336"/>
-                        <a:ext cx="438150" cy="514350"/>
-                      </a:xfrm>
-                      <a:prstGeom prst="rect">
-                        <a:avLst/>
-                      </a:prstGeom>
-                    </p:spPr>
-                  </p:pic>
-                </p:oleObj>
-              </mc:Fallback>
-            </mc:AlternateContent>
-          </a:graphicData>
-        </a:graphic>
-      </p:graphicFrame>
-      <p:graphicFrame>
-        <p:nvGraphicFramePr>
-          <p:cNvPr id="14" name="Object 13">
-            <a:extLst>
-              <a:ext uri="{FF2B5EF4-FFF2-40B4-BE49-F238E27FC236}">
-                <a16:creationId xmlns:a16="http://schemas.microsoft.com/office/drawing/2014/main" id="{E5AF915B-6E37-018F-7816-0DECA3E82D3A}"/>
-              </a:ext>
-            </a:extLst>
-          </p:cNvPr>
-          <p:cNvGraphicFramePr>
-            <a:graphicFrameLocks noChangeAspect="1"/>
-          </p:cNvGraphicFramePr>
-          <p:nvPr>
-            <p:extLst>
-              <p:ext uri="{D42A27DB-BD31-4B8C-83A1-F6EECF244321}">
-                <p14:modId xmlns:p14="http://schemas.microsoft.com/office/powerpoint/2010/main" val="464092023"/>
-              </p:ext>
-            </p:extLst>
-          </p:nvPr>
-        </p:nvGraphicFramePr>
-        <p:xfrm>
-          <a:off x="2461831" y="2027336"/>
-          <a:ext cx="619125" cy="514350"/>
-        </p:xfrm>
-        <a:graphic>
-          <a:graphicData uri="http://schemas.openxmlformats.org/presentationml/2006/ole">
-            <mc:AlternateContent xmlns:mc="http://schemas.openxmlformats.org/markup-compatibility/2006">
-              <mc:Choice xmlns:v="urn:schemas-microsoft-com:vml" Requires="v">
-                <p:oleObj name="Packager Shell Object" showAsIcon="1" r:id="rId6" imgW="619061" imgH="514350" progId="Package">
-                  <p:embed/>
-                </p:oleObj>
-              </mc:Choice>
-              <mc:Fallback>
-                <p:oleObj name="Packager Shell Object" showAsIcon="1" r:id="rId6" imgW="619061" imgH="514350" progId="Package">
-                  <p:embed/>
-                  <p:pic>
-                    <p:nvPicPr>
-                      <p:cNvPr id="0" name=""/>
-                      <p:cNvPicPr/>
-                      <p:nvPr/>
-                    </p:nvPicPr>
-                    <p:blipFill>
-                      <a:blip r:embed="rId7"/>
-                      <a:stretch>
-                        <a:fillRect/>
-                      </a:stretch>
-                    </p:blipFill>
-                    <p:spPr>
-                      <a:xfrm>
-                        <a:off x="2461831" y="2027336"/>
-                        <a:ext cx="619125" cy="514350"/>
-                      </a:xfrm>
-                      <a:prstGeom prst="rect">
-                        <a:avLst/>
-                      </a:prstGeom>
-                    </p:spPr>
-                  </p:pic>
-                </p:oleObj>
-              </mc:Fallback>
-            </mc:AlternateContent>
-          </a:graphicData>
-        </a:graphic>
-      </p:graphicFrame>
-      <p:graphicFrame>
-        <p:nvGraphicFramePr>
           <p:cNvPr id="15" name="Object 14">
             <a:extLst>
               <a:ext uri="{FF2B5EF4-FFF2-40B4-BE49-F238E27FC236}">
@@ -7153,12 +6964,12 @@
           <a:graphicData uri="http://schemas.openxmlformats.org/presentationml/2006/ole">
             <mc:AlternateContent xmlns:mc="http://schemas.openxmlformats.org/markup-compatibility/2006">
               <mc:Choice xmlns:v="urn:schemas-microsoft-com:vml" Requires="v">
-                <p:oleObj name="Packager Shell Object" showAsIcon="1" r:id="rId8" imgW="723975" imgH="514350" progId="Package">
+                <p:oleObj name="Packager Shell Object" showAsIcon="1" r:id="rId2" imgW="723975" imgH="514350" progId="Package">
                   <p:embed/>
                 </p:oleObj>
               </mc:Choice>
               <mc:Fallback>
-                <p:oleObj name="Packager Shell Object" showAsIcon="1" r:id="rId8" imgW="723975" imgH="514350" progId="Package">
+                <p:oleObj name="Packager Shell Object" showAsIcon="1" r:id="rId2" imgW="723975" imgH="514350" progId="Package">
                   <p:embed/>
                   <p:pic>
                     <p:nvPicPr>
@@ -7167,7 +6978,7 @@
                       <p:nvPr/>
                     </p:nvPicPr>
                     <p:blipFill>
-                      <a:blip r:embed="rId9"/>
+                      <a:blip r:embed="rId3"/>
                       <a:stretch>
                         <a:fillRect/>
                       </a:stretch>
@@ -7216,12 +7027,12 @@
           <a:graphicData uri="http://schemas.openxmlformats.org/presentationml/2006/ole">
             <mc:AlternateContent xmlns:mc="http://schemas.openxmlformats.org/markup-compatibility/2006">
               <mc:Choice xmlns:v="urn:schemas-microsoft-com:vml" Requires="v">
-                <p:oleObj name="Packager Shell Object" showAsIcon="1" r:id="rId10" imgW="1219080" imgH="514350" progId="Package">
+                <p:oleObj name="Packager Shell Object" showAsIcon="1" r:id="rId4" imgW="1219080" imgH="514350" progId="Package">
                   <p:embed/>
                 </p:oleObj>
               </mc:Choice>
               <mc:Fallback>
-                <p:oleObj name="Packager Shell Object" showAsIcon="1" r:id="rId10" imgW="1219080" imgH="514350" progId="Package">
+                <p:oleObj name="Packager Shell Object" showAsIcon="1" r:id="rId4" imgW="1219080" imgH="514350" progId="Package">
                   <p:embed/>
                   <p:pic>
                     <p:nvPicPr>
@@ -7230,7 +7041,7 @@
                       <p:nvPr/>
                     </p:nvPicPr>
                     <p:blipFill>
-                      <a:blip r:embed="rId11"/>
+                      <a:blip r:embed="rId5"/>
                       <a:stretch>
                         <a:fillRect/>
                       </a:stretch>
@@ -7251,66 +7062,6 @@
           </a:graphicData>
         </a:graphic>
       </p:graphicFrame>
-      <p:pic>
-        <p:nvPicPr>
-          <p:cNvPr id="18" name="Picture 17">
-            <a:extLst>
-              <a:ext uri="{FF2B5EF4-FFF2-40B4-BE49-F238E27FC236}">
-                <a16:creationId xmlns:a16="http://schemas.microsoft.com/office/drawing/2014/main" id="{B95EC2E8-A1DA-9183-7E44-A296559D038C}"/>
-              </a:ext>
-            </a:extLst>
-          </p:cNvPr>
-          <p:cNvPicPr>
-            <a:picLocks noChangeAspect="1"/>
-          </p:cNvPicPr>
-          <p:nvPr/>
-        </p:nvPicPr>
-        <p:blipFill>
-          <a:blip r:embed="rId12"/>
-          <a:stretch>
-            <a:fillRect/>
-          </a:stretch>
-        </p:blipFill>
-        <p:spPr>
-          <a:xfrm>
-            <a:off x="155079" y="3614510"/>
-            <a:ext cx="4801618" cy="2789159"/>
-          </a:xfrm>
-          <a:prstGeom prst="rect">
-            <a:avLst/>
-          </a:prstGeom>
-        </p:spPr>
-      </p:pic>
-      <p:pic>
-        <p:nvPicPr>
-          <p:cNvPr id="22" name="Picture 21">
-            <a:extLst>
-              <a:ext uri="{FF2B5EF4-FFF2-40B4-BE49-F238E27FC236}">
-                <a16:creationId xmlns:a16="http://schemas.microsoft.com/office/drawing/2014/main" id="{B9699A77-0B59-AFDA-CC54-84F70337A4F9}"/>
-              </a:ext>
-            </a:extLst>
-          </p:cNvPr>
-          <p:cNvPicPr>
-            <a:picLocks noChangeAspect="1"/>
-          </p:cNvPicPr>
-          <p:nvPr/>
-        </p:nvPicPr>
-        <p:blipFill>
-          <a:blip r:embed="rId13"/>
-          <a:stretch>
-            <a:fillRect/>
-          </a:stretch>
-        </p:blipFill>
-        <p:spPr>
-          <a:xfrm>
-            <a:off x="5028759" y="3604662"/>
-            <a:ext cx="3960162" cy="2789159"/>
-          </a:xfrm>
-          <a:prstGeom prst="rect">
-            <a:avLst/>
-          </a:prstGeom>
-        </p:spPr>
-      </p:pic>
       <p:sp>
         <p:nvSpPr>
           <p:cNvPr id="23" name="TextBox 22">
@@ -7381,6 +7132,255 @@
           </a:p>
         </p:txBody>
       </p:sp>
+      <p:graphicFrame>
+        <p:nvGraphicFramePr>
+          <p:cNvPr id="6" name="Object 5">
+            <a:extLst>
+              <a:ext uri="{FF2B5EF4-FFF2-40B4-BE49-F238E27FC236}">
+                <a16:creationId xmlns:a16="http://schemas.microsoft.com/office/drawing/2014/main" id="{9A8F2426-A10B-2449-5958-520A6CFFB4BC}"/>
+              </a:ext>
+            </a:extLst>
+          </p:cNvPr>
+          <p:cNvGraphicFramePr>
+            <a:graphicFrameLocks noChangeAspect="1"/>
+          </p:cNvGraphicFramePr>
+          <p:nvPr>
+            <p:extLst>
+              <p:ext uri="{D42A27DB-BD31-4B8C-83A1-F6EECF244321}">
+                <p14:modId xmlns:p14="http://schemas.microsoft.com/office/powerpoint/2010/main" val="3549695675"/>
+              </p:ext>
+            </p:extLst>
+          </p:nvPr>
+        </p:nvGraphicFramePr>
+        <p:xfrm>
+          <a:off x="1035850" y="1929372"/>
+          <a:ext cx="619125" cy="514350"/>
+        </p:xfrm>
+        <a:graphic>
+          <a:graphicData uri="http://schemas.openxmlformats.org/presentationml/2006/ole">
+            <mc:AlternateContent xmlns:mc="http://schemas.openxmlformats.org/markup-compatibility/2006">
+              <mc:Choice xmlns:v="urn:schemas-microsoft-com:vml" Requires="v">
+                <p:oleObj name="Packager Shell Object" showAsIcon="1" r:id="rId6" imgW="619061" imgH="514350" progId="Package">
+                  <p:embed/>
+                </p:oleObj>
+              </mc:Choice>
+              <mc:Fallback>
+                <p:oleObj name="Packager Shell Object" showAsIcon="1" r:id="rId6" imgW="619061" imgH="514350" progId="Package">
+                  <p:embed/>
+                  <p:pic>
+                    <p:nvPicPr>
+                      <p:cNvPr id="0" name=""/>
+                      <p:cNvPicPr/>
+                      <p:nvPr/>
+                    </p:nvPicPr>
+                    <p:blipFill>
+                      <a:blip r:embed="rId7"/>
+                      <a:stretch>
+                        <a:fillRect/>
+                      </a:stretch>
+                    </p:blipFill>
+                    <p:spPr>
+                      <a:xfrm>
+                        <a:off x="1035850" y="1929372"/>
+                        <a:ext cx="619125" cy="514350"/>
+                      </a:xfrm>
+                      <a:prstGeom prst="rect">
+                        <a:avLst/>
+                      </a:prstGeom>
+                    </p:spPr>
+                  </p:pic>
+                </p:oleObj>
+              </mc:Fallback>
+            </mc:AlternateContent>
+          </a:graphicData>
+        </a:graphic>
+      </p:graphicFrame>
+      <p:graphicFrame>
+        <p:nvGraphicFramePr>
+          <p:cNvPr id="7" name="Object 6">
+            <a:extLst>
+              <a:ext uri="{FF2B5EF4-FFF2-40B4-BE49-F238E27FC236}">
+                <a16:creationId xmlns:a16="http://schemas.microsoft.com/office/drawing/2014/main" id="{85DA6C2F-0936-3898-0118-F4886BFEB18C}"/>
+              </a:ext>
+            </a:extLst>
+          </p:cNvPr>
+          <p:cNvGraphicFramePr>
+            <a:graphicFrameLocks noChangeAspect="1"/>
+          </p:cNvGraphicFramePr>
+          <p:nvPr>
+            <p:extLst>
+              <p:ext uri="{D42A27DB-BD31-4B8C-83A1-F6EECF244321}">
+                <p14:modId xmlns:p14="http://schemas.microsoft.com/office/powerpoint/2010/main" val="846444429"/>
+              </p:ext>
+            </p:extLst>
+          </p:nvPr>
+        </p:nvGraphicFramePr>
+        <p:xfrm>
+          <a:off x="1654975" y="1949060"/>
+          <a:ext cx="438150" cy="514350"/>
+        </p:xfrm>
+        <a:graphic>
+          <a:graphicData uri="http://schemas.openxmlformats.org/presentationml/2006/ole">
+            <mc:AlternateContent xmlns:mc="http://schemas.openxmlformats.org/markup-compatibility/2006">
+              <mc:Choice xmlns:v="urn:schemas-microsoft-com:vml" Requires="v">
+                <p:oleObj name="Packager Shell Object" showAsIcon="1" r:id="rId8" imgW="437978" imgH="514350" progId="Package">
+                  <p:embed/>
+                </p:oleObj>
+              </mc:Choice>
+              <mc:Fallback>
+                <p:oleObj name="Packager Shell Object" showAsIcon="1" r:id="rId8" imgW="437978" imgH="514350" progId="Package">
+                  <p:embed/>
+                  <p:pic>
+                    <p:nvPicPr>
+                      <p:cNvPr id="0" name=""/>
+                      <p:cNvPicPr/>
+                      <p:nvPr/>
+                    </p:nvPicPr>
+                    <p:blipFill>
+                      <a:blip r:embed="rId9"/>
+                      <a:stretch>
+                        <a:fillRect/>
+                      </a:stretch>
+                    </p:blipFill>
+                    <p:spPr>
+                      <a:xfrm>
+                        <a:off x="1654975" y="1949060"/>
+                        <a:ext cx="438150" cy="514350"/>
+                      </a:xfrm>
+                      <a:prstGeom prst="rect">
+                        <a:avLst/>
+                      </a:prstGeom>
+                    </p:spPr>
+                  </p:pic>
+                </p:oleObj>
+              </mc:Fallback>
+            </mc:AlternateContent>
+          </a:graphicData>
+        </a:graphic>
+      </p:graphicFrame>
+      <p:graphicFrame>
+        <p:nvGraphicFramePr>
+          <p:cNvPr id="8" name="Object 7">
+            <a:extLst>
+              <a:ext uri="{FF2B5EF4-FFF2-40B4-BE49-F238E27FC236}">
+                <a16:creationId xmlns:a16="http://schemas.microsoft.com/office/drawing/2014/main" id="{D228DBCB-E3CE-71AE-B32B-6E971F24BB8D}"/>
+              </a:ext>
+            </a:extLst>
+          </p:cNvPr>
+          <p:cNvGraphicFramePr>
+            <a:graphicFrameLocks noChangeAspect="1"/>
+          </p:cNvGraphicFramePr>
+          <p:nvPr>
+            <p:extLst>
+              <p:ext uri="{D42A27DB-BD31-4B8C-83A1-F6EECF244321}">
+                <p14:modId xmlns:p14="http://schemas.microsoft.com/office/powerpoint/2010/main" val="3715923466"/>
+              </p:ext>
+            </p:extLst>
+          </p:nvPr>
+        </p:nvGraphicFramePr>
+        <p:xfrm>
+          <a:off x="344830" y="1939211"/>
+          <a:ext cx="771525" cy="514350"/>
+        </p:xfrm>
+        <a:graphic>
+          <a:graphicData uri="http://schemas.openxmlformats.org/presentationml/2006/ole">
+            <mc:AlternateContent xmlns:mc="http://schemas.openxmlformats.org/markup-compatibility/2006">
+              <mc:Choice xmlns:v="urn:schemas-microsoft-com:vml" Requires="v">
+                <p:oleObj name="Packager Shell Object" showAsIcon="1" r:id="rId10" imgW="771401" imgH="514350" progId="Package">
+                  <p:embed/>
+                </p:oleObj>
+              </mc:Choice>
+              <mc:Fallback>
+                <p:oleObj name="Packager Shell Object" showAsIcon="1" r:id="rId10" imgW="771401" imgH="514350" progId="Package">
+                  <p:embed/>
+                  <p:pic>
+                    <p:nvPicPr>
+                      <p:cNvPr id="0" name=""/>
+                      <p:cNvPicPr/>
+                      <p:nvPr/>
+                    </p:nvPicPr>
+                    <p:blipFill>
+                      <a:blip r:embed="rId11"/>
+                      <a:stretch>
+                        <a:fillRect/>
+                      </a:stretch>
+                    </p:blipFill>
+                    <p:spPr>
+                      <a:xfrm>
+                        <a:off x="344830" y="1939211"/>
+                        <a:ext cx="771525" cy="514350"/>
+                      </a:xfrm>
+                      <a:prstGeom prst="rect">
+                        <a:avLst/>
+                      </a:prstGeom>
+                    </p:spPr>
+                  </p:pic>
+                </p:oleObj>
+              </mc:Fallback>
+            </mc:AlternateContent>
+          </a:graphicData>
+        </a:graphic>
+      </p:graphicFrame>
+      <p:pic>
+        <p:nvPicPr>
+          <p:cNvPr id="11" name="Picture 10">
+            <a:extLst>
+              <a:ext uri="{FF2B5EF4-FFF2-40B4-BE49-F238E27FC236}">
+                <a16:creationId xmlns:a16="http://schemas.microsoft.com/office/drawing/2014/main" id="{4219A118-4AB6-7858-C137-FD6983A6013E}"/>
+              </a:ext>
+            </a:extLst>
+          </p:cNvPr>
+          <p:cNvPicPr>
+            <a:picLocks noChangeAspect="1"/>
+          </p:cNvPicPr>
+          <p:nvPr/>
+        </p:nvPicPr>
+        <p:blipFill>
+          <a:blip r:embed="rId12"/>
+          <a:stretch>
+            <a:fillRect/>
+          </a:stretch>
+        </p:blipFill>
+        <p:spPr>
+          <a:xfrm>
+            <a:off x="240323" y="3644783"/>
+            <a:ext cx="4788436" cy="2448088"/>
+          </a:xfrm>
+          <a:prstGeom prst="rect">
+            <a:avLst/>
+          </a:prstGeom>
+        </p:spPr>
+      </p:pic>
+      <p:pic>
+        <p:nvPicPr>
+          <p:cNvPr id="17" name="Picture 16">
+            <a:extLst>
+              <a:ext uri="{FF2B5EF4-FFF2-40B4-BE49-F238E27FC236}">
+                <a16:creationId xmlns:a16="http://schemas.microsoft.com/office/drawing/2014/main" id="{248E3CDB-7FFD-33BE-9AA0-B5795CFDBF50}"/>
+              </a:ext>
+            </a:extLst>
+          </p:cNvPr>
+          <p:cNvPicPr>
+            <a:picLocks noChangeAspect="1"/>
+          </p:cNvPicPr>
+          <p:nvPr/>
+        </p:nvPicPr>
+        <p:blipFill>
+          <a:blip r:embed="rId13"/>
+          <a:stretch>
+            <a:fillRect/>
+          </a:stretch>
+        </p:blipFill>
+        <p:spPr>
+          <a:xfrm>
+            <a:off x="5739210" y="3647221"/>
+            <a:ext cx="2585064" cy="3085189"/>
+          </a:xfrm>
+          <a:prstGeom prst="rect">
+            <a:avLst/>
+          </a:prstGeom>
+        </p:spPr>
+      </p:pic>
     </p:spTree>
   </p:cSld>
   <p:clrMapOvr>
@@ -7602,7 +7602,7 @@
         <p:spPr>
           <a:xfrm>
             <a:off x="344830" y="1336675"/>
-            <a:ext cx="7409282" cy="1283044"/>
+            <a:ext cx="7409282" cy="4796826"/>
           </a:xfrm>
           <a:prstGeom prst="rect">
             <a:avLst/>
@@ -7614,15 +7614,15 @@
           </a:bodyPr>
           <a:lstStyle/>
           <a:p>
-            <a:pPr marL="354965" indent="-342265">
+            <a:pPr marL="355600" indent="-342900">
               <a:lnSpc>
                 <a:spcPct val="100000"/>
               </a:lnSpc>
               <a:spcBef>
                 <a:spcPts val="105"/>
               </a:spcBef>
-              <a:buFont typeface="Arial"/>
-              <a:buChar char="•"/>
+              <a:buFont typeface="Wingdings" panose="05000000000000000000" pitchFamily="2" charset="2"/>
+              <a:buChar char="Ø"/>
               <a:tabLst>
                 <a:tab pos="354965" algn="l"/>
               </a:tabLst>
@@ -7772,6 +7772,9 @@
           </a:p>
           <a:p>
             <a:pPr marL="354965" indent="-342265">
+              <a:lnSpc>
+                <a:spcPct val="100000"/>
+              </a:lnSpc>
               <a:spcBef>
                 <a:spcPts val="105"/>
               </a:spcBef>
@@ -7782,25 +7785,38 @@
               </a:tabLst>
             </a:pPr>
             <a:r>
-              <a:rPr lang="en-US" sz="2000" spc="-10" dirty="0">
-                <a:highlight>
-                  <a:srgbClr val="FFFF00"/>
-                </a:highlight>
-                <a:latin typeface="Candara"/>
-                <a:cs typeface="Candara"/>
-              </a:rPr>
-              <a:t>Got stuck at Gate Level Simulation.</a:t>
-            </a:r>
-            <a:r>
               <a:rPr lang="en-IN" sz="2000" spc="-25" dirty="0">
-                <a:highlight>
-                  <a:srgbClr val="FFFF00"/>
-                </a:highlight>
-                <a:latin typeface="Candara"/>
-                <a:cs typeface="Candara"/>
-              </a:rPr>
-              <a:t> But did for counter module.</a:t>
-            </a:r>
+                <a:latin typeface="Candara"/>
+                <a:cs typeface="Candara"/>
+              </a:rPr>
+              <a:t>Observed lot of Warnings post Synthesis. Need to change RTL to fix them. Most of them are… </a:t>
+            </a:r>
+          </a:p>
+          <a:p>
+            <a:pPr marL="355600" indent="-342900">
+              <a:lnSpc>
+                <a:spcPct val="100000"/>
+              </a:lnSpc>
+              <a:spcBef>
+                <a:spcPts val="105"/>
+              </a:spcBef>
+              <a:buFont typeface="Courier New" panose="02070309020205020404" pitchFamily="49" charset="0"/>
+              <a:buChar char="o"/>
+              <a:tabLst>
+                <a:tab pos="354965" algn="l"/>
+              </a:tabLst>
+            </a:pPr>
+            <a:r>
+              <a:rPr lang="en-US" sz="2000" spc="-25" dirty="0">
+                <a:latin typeface="Candara"/>
+                <a:cs typeface="Candara"/>
+              </a:rPr>
+              <a:t>Signal or variable has multiple drivers. [CDFG2G-622]</a:t>
+            </a:r>
+            <a:endParaRPr lang="en-IN" sz="2000" spc="-25" dirty="0">
+              <a:latin typeface="Candara"/>
+              <a:cs typeface="Candara"/>
+            </a:endParaRPr>
           </a:p>
           <a:p>
             <a:pPr marL="354965" indent="-342265">
@@ -7816,47 +7832,137 @@
                 <a:tab pos="354965" algn="l"/>
               </a:tabLst>
             </a:pPr>
-            <a:r>
-              <a:rPr lang="en-US" sz="2000" dirty="0" err="1">
-                <a:highlight>
-                  <a:srgbClr val="FFFF00"/>
-                </a:highlight>
-                <a:latin typeface="Candara"/>
-                <a:cs typeface="Candara"/>
-              </a:rPr>
-              <a:t>WorkSpace</a:t>
-            </a:r>
-            <a:r>
-              <a:rPr lang="en-US" sz="2000" dirty="0">
-                <a:highlight>
-                  <a:srgbClr val="FFFF00"/>
-                </a:highlight>
-                <a:latin typeface="Candara"/>
-                <a:cs typeface="Candara"/>
-              </a:rPr>
-              <a:t>: /home/client25/Desktop/PVR/</a:t>
-            </a:r>
-            <a:r>
-              <a:rPr lang="en-US" sz="2000" dirty="0" err="1">
-                <a:highlight>
-                  <a:srgbClr val="FFFF00"/>
-                </a:highlight>
-                <a:latin typeface="Candara"/>
-                <a:cs typeface="Candara"/>
-              </a:rPr>
-              <a:t>ML_Project</a:t>
-            </a:r>
-            <a:r>
-              <a:rPr lang="en-US" sz="2000" dirty="0">
-                <a:highlight>
-                  <a:srgbClr val="FFFF00"/>
-                </a:highlight>
-                <a:latin typeface="Candara"/>
-                <a:cs typeface="Candara"/>
-              </a:rPr>
-              <a:t>/</a:t>
-            </a:r>
-            <a:endParaRPr sz="2000" dirty="0">
+            <a:endParaRPr lang="en-IN" sz="2000" spc="-25" dirty="0">
+              <a:latin typeface="Candara"/>
+              <a:cs typeface="Candara"/>
+            </a:endParaRPr>
+          </a:p>
+          <a:p>
+            <a:pPr marL="354965" indent="-342265">
+              <a:lnSpc>
+                <a:spcPct val="100000"/>
+              </a:lnSpc>
+              <a:spcBef>
+                <a:spcPts val="105"/>
+              </a:spcBef>
+              <a:buFont typeface="Arial"/>
+              <a:buChar char="•"/>
+              <a:tabLst>
+                <a:tab pos="354965" algn="l"/>
+              </a:tabLst>
+            </a:pPr>
+            <a:endParaRPr lang="en-IN" sz="2000" spc="-25" dirty="0">
+              <a:latin typeface="Candara"/>
+              <a:cs typeface="Candara"/>
+            </a:endParaRPr>
+          </a:p>
+          <a:p>
+            <a:pPr marL="354965" indent="-342265">
+              <a:lnSpc>
+                <a:spcPct val="100000"/>
+              </a:lnSpc>
+              <a:spcBef>
+                <a:spcPts val="105"/>
+              </a:spcBef>
+              <a:buFont typeface="Arial"/>
+              <a:buChar char="•"/>
+              <a:tabLst>
+                <a:tab pos="354965" algn="l"/>
+              </a:tabLst>
+            </a:pPr>
+            <a:endParaRPr lang="en-IN" sz="2000" spc="-25" dirty="0">
+              <a:latin typeface="Candara"/>
+              <a:cs typeface="Candara"/>
+            </a:endParaRPr>
+          </a:p>
+          <a:p>
+            <a:pPr marL="354965" indent="-342265">
+              <a:lnSpc>
+                <a:spcPct val="100000"/>
+              </a:lnSpc>
+              <a:spcBef>
+                <a:spcPts val="105"/>
+              </a:spcBef>
+              <a:buFont typeface="Arial"/>
+              <a:buChar char="•"/>
+              <a:tabLst>
+                <a:tab pos="354965" algn="l"/>
+              </a:tabLst>
+            </a:pPr>
+            <a:endParaRPr lang="en-IN" sz="2000" spc="-25" dirty="0">
+              <a:latin typeface="Candara"/>
+              <a:cs typeface="Candara"/>
+            </a:endParaRPr>
+          </a:p>
+          <a:p>
+            <a:pPr marL="354965" indent="-342265">
+              <a:lnSpc>
+                <a:spcPct val="100000"/>
+              </a:lnSpc>
+              <a:spcBef>
+                <a:spcPts val="105"/>
+              </a:spcBef>
+              <a:buFont typeface="Arial"/>
+              <a:buChar char="•"/>
+              <a:tabLst>
+                <a:tab pos="354965" algn="l"/>
+              </a:tabLst>
+            </a:pPr>
+            <a:endParaRPr lang="en-IN" sz="2000" spc="-25" dirty="0">
+              <a:latin typeface="Candara"/>
+              <a:cs typeface="Candara"/>
+            </a:endParaRPr>
+          </a:p>
+          <a:p>
+            <a:pPr marL="354965" indent="-342265">
+              <a:lnSpc>
+                <a:spcPct val="100000"/>
+              </a:lnSpc>
+              <a:spcBef>
+                <a:spcPts val="105"/>
+              </a:spcBef>
+              <a:buFont typeface="Arial"/>
+              <a:buChar char="•"/>
+              <a:tabLst>
+                <a:tab pos="354965" algn="l"/>
+              </a:tabLst>
+            </a:pPr>
+            <a:endParaRPr lang="en-IN" sz="2000" spc="-25" dirty="0">
+              <a:latin typeface="Candara"/>
+              <a:cs typeface="Candara"/>
+            </a:endParaRPr>
+          </a:p>
+          <a:p>
+            <a:pPr marL="354965" indent="-342265">
+              <a:lnSpc>
+                <a:spcPct val="100000"/>
+              </a:lnSpc>
+              <a:spcBef>
+                <a:spcPts val="105"/>
+              </a:spcBef>
+              <a:buFont typeface="Arial"/>
+              <a:buChar char="•"/>
+              <a:tabLst>
+                <a:tab pos="354965" algn="l"/>
+              </a:tabLst>
+            </a:pPr>
+            <a:endParaRPr lang="en-IN" sz="2000" spc="-25" dirty="0">
+              <a:latin typeface="Candara"/>
+              <a:cs typeface="Candara"/>
+            </a:endParaRPr>
+          </a:p>
+          <a:p>
+            <a:pPr marL="354965" indent="-342265">
+              <a:spcBef>
+                <a:spcPts val="105"/>
+              </a:spcBef>
+              <a:buFont typeface="Arial"/>
+              <a:buChar char="•"/>
+              <a:tabLst>
+                <a:tab pos="354965" algn="l"/>
+              </a:tabLst>
+            </a:pPr>
+            <a:endParaRPr lang="en-US" sz="2000" spc="-10" dirty="0">
               <a:highlight>
                 <a:srgbClr val="FFFF00"/>
               </a:highlight>
@@ -7864,8 +7970,76 @@
               <a:cs typeface="Candara"/>
             </a:endParaRPr>
           </a:p>
+          <a:p>
+            <a:pPr marL="354965" indent="-342265">
+              <a:spcBef>
+                <a:spcPts val="105"/>
+              </a:spcBef>
+              <a:buFont typeface="Arial"/>
+              <a:buChar char="•"/>
+              <a:tabLst>
+                <a:tab pos="354965" algn="l"/>
+              </a:tabLst>
+            </a:pPr>
+            <a:endParaRPr lang="en-US" sz="2000" spc="-10" dirty="0">
+              <a:highlight>
+                <a:srgbClr val="FFFF00"/>
+              </a:highlight>
+              <a:latin typeface="Candara"/>
+              <a:cs typeface="Candara"/>
+            </a:endParaRPr>
+          </a:p>
+          <a:p>
+            <a:pPr marL="354965" indent="-342265">
+              <a:spcBef>
+                <a:spcPts val="105"/>
+              </a:spcBef>
+              <a:buFont typeface="Arial"/>
+              <a:buChar char="•"/>
+              <a:tabLst>
+                <a:tab pos="354965" algn="l"/>
+              </a:tabLst>
+            </a:pPr>
+            <a:endParaRPr lang="en-US" sz="2000" spc="-10" dirty="0">
+              <a:highlight>
+                <a:srgbClr val="FFFF00"/>
+              </a:highlight>
+              <a:latin typeface="Candara"/>
+              <a:cs typeface="Candara"/>
+            </a:endParaRPr>
+          </a:p>
         </p:txBody>
       </p:sp>
+      <p:pic>
+        <p:nvPicPr>
+          <p:cNvPr id="7" name="Picture 6">
+            <a:extLst>
+              <a:ext uri="{FF2B5EF4-FFF2-40B4-BE49-F238E27FC236}">
+                <a16:creationId xmlns:a16="http://schemas.microsoft.com/office/drawing/2014/main" id="{82490DE5-AC95-1A5F-0186-FDE86A548B1F}"/>
+              </a:ext>
+            </a:extLst>
+          </p:cNvPr>
+          <p:cNvPicPr>
+            <a:picLocks noChangeAspect="1"/>
+          </p:cNvPicPr>
+          <p:nvPr/>
+        </p:nvPicPr>
+        <p:blipFill>
+          <a:blip r:embed="rId2"/>
+          <a:stretch>
+            <a:fillRect/>
+          </a:stretch>
+        </p:blipFill>
+        <p:spPr>
+          <a:xfrm>
+            <a:off x="681488" y="2939812"/>
+            <a:ext cx="6115057" cy="2990575"/>
+          </a:xfrm>
+          <a:prstGeom prst="rect">
+            <a:avLst/>
+          </a:prstGeom>
+        </p:spPr>
+      </p:pic>
     </p:spTree>
   </p:cSld>
   <p:clrMapOvr>
@@ -8196,7 +8370,7 @@
                 <a:latin typeface="Candara"/>
                 <a:cs typeface="Candara"/>
               </a:rPr>
-              <a:t>Got stuck at Gate Level Simulation.</a:t>
+              <a:t>Got stuck at LEC.</a:t>
             </a:r>
             <a:r>
               <a:rPr lang="en-IN" sz="2000" spc="-25" dirty="0">
@@ -8206,14 +8380,11 @@
                 <a:latin typeface="Candara"/>
                 <a:cs typeface="Candara"/>
               </a:rPr>
-              <a:t> But did for counter module.</a:t>
+              <a:t> </a:t>
             </a:r>
           </a:p>
           <a:p>
             <a:pPr marL="354965" indent="-342265">
-              <a:lnSpc>
-                <a:spcPct val="100000"/>
-              </a:lnSpc>
               <a:spcBef>
                 <a:spcPts val="105"/>
               </a:spcBef>
@@ -9153,18 +9324,15 @@
                 <a:latin typeface="Candara"/>
                 <a:cs typeface="Candara"/>
               </a:rPr>
-              <a:t>Got stuck at Gate Level Simulation.</a:t>
-            </a:r>
-            <a:r>
-              <a:rPr lang="en-IN" sz="2000" spc="-25" dirty="0">
-                <a:highlight>
-                  <a:srgbClr val="FFFF00"/>
-                </a:highlight>
-                <a:latin typeface="Candara"/>
-                <a:cs typeface="Candara"/>
-              </a:rPr>
-              <a:t> But did for counter module.</a:t>
-            </a:r>
+              <a:t>Got stuck at LEC.</a:t>
+            </a:r>
+            <a:endParaRPr lang="en-IN" sz="2000" spc="-25" dirty="0">
+              <a:highlight>
+                <a:srgbClr val="FFFF00"/>
+              </a:highlight>
+              <a:latin typeface="Candara"/>
+              <a:cs typeface="Candara"/>
+            </a:endParaRPr>
           </a:p>
           <a:p>
             <a:pPr marL="354965" indent="-342265">
@@ -9713,18 +9881,15 @@
                 <a:latin typeface="Candara"/>
                 <a:cs typeface="Candara"/>
               </a:rPr>
-              <a:t>Got stuck at Gate Level Simulation.</a:t>
-            </a:r>
-            <a:r>
-              <a:rPr lang="en-IN" sz="2000" spc="-25" dirty="0">
-                <a:highlight>
-                  <a:srgbClr val="FFFF00"/>
-                </a:highlight>
-                <a:latin typeface="Candara"/>
-                <a:cs typeface="Candara"/>
-              </a:rPr>
-              <a:t> But did for counter module.</a:t>
-            </a:r>
+              <a:t>Got stuck at LEC.</a:t>
+            </a:r>
+            <a:endParaRPr lang="en-IN" sz="2000" spc="-25" dirty="0">
+              <a:highlight>
+                <a:srgbClr val="FFFF00"/>
+              </a:highlight>
+              <a:latin typeface="Candara"/>
+              <a:cs typeface="Candara"/>
+            </a:endParaRPr>
           </a:p>
           <a:p>
             <a:pPr marL="354965" indent="-342265">
@@ -10688,7 +10853,7 @@
                 <a:latin typeface="Candara"/>
                 <a:cs typeface="Candara"/>
               </a:rPr>
-              <a:t>Got stuck at Gate Level Simulation.</a:t>
+              <a:t>Got stuck at LEC</a:t>
             </a:r>
             <a:r>
               <a:rPr lang="en-IN" sz="2000" spc="-25" dirty="0">
@@ -10698,7 +10863,7 @@
                 <a:latin typeface="Candara"/>
                 <a:cs typeface="Candara"/>
               </a:rPr>
-              <a:t> But did for counter module.</a:t>
+              <a:t>.</a:t>
             </a:r>
           </a:p>
           <a:p>

</xml_diff>

<commit_message>
Changed code with TASK & added Syntesis + LEC reports.
</commit_message>
<xml_diff>
--- a/Project_Report/ASIC for Neural Network inference_P_V_Rajesh_Kumar.pptx
+++ b/Project_Report/ASIC for Neural Network inference_P_V_Rajesh_Kumar.pptx
@@ -152,7 +152,7 @@
           <a:p>
             <a:fld id="{BA6A18BC-8377-41FB-854C-CD5DE3F7CB9E}" type="datetimeFigureOut">
               <a:rPr lang="en-IN" smtClean="0"/>
-              <a:t>11-04-2024</a:t>
+              <a:t>12-04-2024</a:t>
             </a:fld>
             <a:endParaRPr lang="en-IN"/>
           </a:p>
@@ -831,7 +831,7 @@
           <a:p>
             <a:fld id="{1D8BD707-D9CF-40AE-B4C6-C98DA3205C09}" type="datetimeFigureOut">
               <a:rPr lang="en-US"/>
-              <a:t>4/11/2024</a:t>
+              <a:t>4/12/2024</a:t>
             </a:fld>
             <a:endParaRPr lang="en-US"/>
           </a:p>
@@ -1098,7 +1098,7 @@
           <a:p>
             <a:fld id="{1D8BD707-D9CF-40AE-B4C6-C98DA3205C09}" type="datetimeFigureOut">
               <a:rPr lang="en-US"/>
-              <a:t>4/11/2024</a:t>
+              <a:t>4/12/2024</a:t>
             </a:fld>
             <a:endParaRPr lang="en-US"/>
           </a:p>
@@ -1402,7 +1402,7 @@
           <a:p>
             <a:fld id="{1D8BD707-D9CF-40AE-B4C6-C98DA3205C09}" type="datetimeFigureOut">
               <a:rPr lang="en-US"/>
-              <a:t>4/11/2024</a:t>
+              <a:t>4/12/2024</a:t>
             </a:fld>
             <a:endParaRPr lang="en-US"/>
           </a:p>
@@ -1640,7 +1640,7 @@
           <a:p>
             <a:fld id="{1D8BD707-D9CF-40AE-B4C6-C98DA3205C09}" type="datetimeFigureOut">
               <a:rPr lang="en-US"/>
-              <a:t>4/11/2024</a:t>
+              <a:t>4/12/2024</a:t>
             </a:fld>
             <a:endParaRPr lang="en-US"/>
           </a:p>
@@ -1849,7 +1849,7 @@
           <a:p>
             <a:fld id="{1D8BD707-D9CF-40AE-B4C6-C98DA3205C09}" type="datetimeFigureOut">
               <a:rPr lang="en-US"/>
-              <a:t>4/11/2024</a:t>
+              <a:t>4/12/2024</a:t>
             </a:fld>
             <a:endParaRPr lang="en-US"/>
           </a:p>
@@ -2300,7 +2300,7 @@
           <a:p>
             <a:fld id="{1D8BD707-D9CF-40AE-B4C6-C98DA3205C09}" type="datetimeFigureOut">
               <a:rPr lang="en-US"/>
-              <a:t>4/11/2024</a:t>
+              <a:t>4/12/2024</a:t>
             </a:fld>
             <a:endParaRPr lang="en-US"/>
           </a:p>
@@ -5858,7 +5858,7 @@
         <p:spPr>
           <a:xfrm>
             <a:off x="463702" y="843533"/>
-            <a:ext cx="8314538" cy="5706690"/>
+            <a:ext cx="8314538" cy="5245026"/>
           </a:xfrm>
           <a:prstGeom prst="rect">
             <a:avLst/>
@@ -6294,81 +6294,6 @@
               </a:tabLst>
             </a:pPr>
             <a:r>
-              <a:rPr sz="2000" strike="sngStrike" spc="-10" dirty="0">
-                <a:latin typeface="Candara"/>
-                <a:cs typeface="Candara"/>
-              </a:rPr>
-              <a:t>Post-</a:t>
-            </a:r>
-            <a:r>
-              <a:rPr sz="2000" strike="sngStrike" dirty="0">
-                <a:latin typeface="Candara"/>
-                <a:cs typeface="Candara"/>
-              </a:rPr>
-              <a:t>synthesis:</a:t>
-            </a:r>
-            <a:r>
-              <a:rPr sz="2000" strike="sngStrike" spc="-60" dirty="0">
-                <a:latin typeface="Candara"/>
-                <a:cs typeface="Candara"/>
-              </a:rPr>
-              <a:t> </a:t>
-            </a:r>
-            <a:r>
-              <a:rPr sz="2000" strike="sngStrike" dirty="0">
-                <a:latin typeface="Candara"/>
-                <a:cs typeface="Candara"/>
-              </a:rPr>
-              <a:t>(same</a:t>
-            </a:r>
-            <a:r>
-              <a:rPr sz="2000" strike="sngStrike" spc="-35" dirty="0">
-                <a:latin typeface="Candara"/>
-                <a:cs typeface="Candara"/>
-              </a:rPr>
-              <a:t> </a:t>
-            </a:r>
-            <a:r>
-              <a:rPr sz="2000" strike="sngStrike" dirty="0">
-                <a:latin typeface="Candara"/>
-                <a:cs typeface="Candara"/>
-              </a:rPr>
-              <a:t>10</a:t>
-            </a:r>
-            <a:r>
-              <a:rPr sz="2000" strike="sngStrike" spc="-15" dirty="0">
-                <a:latin typeface="Candara"/>
-                <a:cs typeface="Candara"/>
-              </a:rPr>
-              <a:t> </a:t>
-            </a:r>
-            <a:r>
-              <a:rPr sz="2000" strike="sngStrike" spc="-10" dirty="0">
-                <a:latin typeface="Candara"/>
-                <a:cs typeface="Candara"/>
-              </a:rPr>
-              <a:t>images)</a:t>
-            </a:r>
-            <a:endParaRPr lang="en-IN" sz="2000" strike="sngStrike" spc="-10" dirty="0">
-              <a:latin typeface="Candara"/>
-              <a:cs typeface="Candara"/>
-            </a:endParaRPr>
-          </a:p>
-          <a:p>
-            <a:pPr marL="812165" lvl="1" indent="-342265">
-              <a:lnSpc>
-                <a:spcPct val="100000"/>
-              </a:lnSpc>
-              <a:spcBef>
-                <a:spcPts val="1200"/>
-              </a:spcBef>
-              <a:buFont typeface="Arial"/>
-              <a:buChar char="•"/>
-              <a:tabLst>
-                <a:tab pos="812165" algn="l"/>
-              </a:tabLst>
-            </a:pPr>
-            <a:r>
               <a:rPr lang="en-IN" sz="2000" spc="-10" dirty="0">
                 <a:highlight>
                   <a:srgbClr val="FFFF00"/>
@@ -6376,7 +6301,7 @@
                 <a:latin typeface="Candara"/>
                 <a:cs typeface="Candara"/>
               </a:rPr>
-              <a:t>Got stuck at LEC.</a:t>
+              <a:t>LEC is stuck at 90%</a:t>
             </a:r>
             <a:endParaRPr sz="2000" dirty="0">
               <a:highlight>
@@ -6598,8 +6523,38 @@
         </p:blipFill>
         <p:spPr>
           <a:xfrm>
-            <a:off x="5371915" y="2808195"/>
-            <a:ext cx="3406325" cy="2534142"/>
+            <a:off x="5974950" y="1423170"/>
+            <a:ext cx="3002045" cy="2233377"/>
+          </a:xfrm>
+          <a:prstGeom prst="rect">
+            <a:avLst/>
+          </a:prstGeom>
+        </p:spPr>
+      </p:pic>
+      <p:pic>
+        <p:nvPicPr>
+          <p:cNvPr id="7" name="Picture 6">
+            <a:extLst>
+              <a:ext uri="{FF2B5EF4-FFF2-40B4-BE49-F238E27FC236}">
+                <a16:creationId xmlns:a16="http://schemas.microsoft.com/office/drawing/2014/main" id="{417F8532-DE1A-8494-68C2-C6CDA96C4D5D}"/>
+              </a:ext>
+            </a:extLst>
+          </p:cNvPr>
+          <p:cNvPicPr>
+            <a:picLocks noChangeAspect="1"/>
+          </p:cNvPicPr>
+          <p:nvPr/>
+        </p:nvPicPr>
+        <p:blipFill>
+          <a:blip r:embed="rId3"/>
+          <a:stretch>
+            <a:fillRect/>
+          </a:stretch>
+        </p:blipFill>
+        <p:spPr>
+          <a:xfrm>
+            <a:off x="5184479" y="3827095"/>
+            <a:ext cx="3495819" cy="1123103"/>
           </a:xfrm>
           <a:prstGeom prst="rect">
             <a:avLst/>
@@ -7134,10 +7089,10 @@
       </p:sp>
       <p:graphicFrame>
         <p:nvGraphicFramePr>
-          <p:cNvPr id="6" name="Object 5">
+          <p:cNvPr id="9" name="Object 8">
             <a:extLst>
               <a:ext uri="{FF2B5EF4-FFF2-40B4-BE49-F238E27FC236}">
-                <a16:creationId xmlns:a16="http://schemas.microsoft.com/office/drawing/2014/main" id="{9A8F2426-A10B-2449-5958-520A6CFFB4BC}"/>
+                <a16:creationId xmlns:a16="http://schemas.microsoft.com/office/drawing/2014/main" id="{283B2CFD-B5EC-135F-4A17-D22035401F1E}"/>
               </a:ext>
             </a:extLst>
           </p:cNvPr>
@@ -7147,25 +7102,25 @@
           <p:nvPr>
             <p:extLst>
               <p:ext uri="{D42A27DB-BD31-4B8C-83A1-F6EECF244321}">
-                <p14:modId xmlns:p14="http://schemas.microsoft.com/office/powerpoint/2010/main" val="3549695675"/>
+                <p14:modId xmlns:p14="http://schemas.microsoft.com/office/powerpoint/2010/main" val="3342152641"/>
               </p:ext>
             </p:extLst>
           </p:nvPr>
         </p:nvGraphicFramePr>
         <p:xfrm>
-          <a:off x="1035850" y="1929372"/>
-          <a:ext cx="619125" cy="514350"/>
+          <a:off x="677863" y="2122488"/>
+          <a:ext cx="771525" cy="514350"/>
         </p:xfrm>
         <a:graphic>
           <a:graphicData uri="http://schemas.openxmlformats.org/presentationml/2006/ole">
             <mc:AlternateContent xmlns:mc="http://schemas.openxmlformats.org/markup-compatibility/2006">
               <mc:Choice xmlns:v="urn:schemas-microsoft-com:vml" Requires="v">
-                <p:oleObj name="Packager Shell Object" showAsIcon="1" r:id="rId6" imgW="619061" imgH="514350" progId="Package">
+                <p:oleObj name="Packager Shell Object" showAsIcon="1" r:id="rId6" imgW="771401" imgH="514350" progId="Package">
                   <p:embed/>
                 </p:oleObj>
               </mc:Choice>
               <mc:Fallback>
-                <p:oleObj name="Packager Shell Object" showAsIcon="1" r:id="rId6" imgW="619061" imgH="514350" progId="Package">
+                <p:oleObj name="Packager Shell Object" showAsIcon="1" r:id="rId6" imgW="771401" imgH="514350" progId="Package">
                   <p:embed/>
                   <p:pic>
                     <p:nvPicPr>
@@ -7181,7 +7136,70 @@
                     </p:blipFill>
                     <p:spPr>
                       <a:xfrm>
-                        <a:off x="1035850" y="1929372"/>
+                        <a:off x="677863" y="2122488"/>
+                        <a:ext cx="771525" cy="514350"/>
+                      </a:xfrm>
+                      <a:prstGeom prst="rect">
+                        <a:avLst/>
+                      </a:prstGeom>
+                    </p:spPr>
+                  </p:pic>
+                </p:oleObj>
+              </mc:Fallback>
+            </mc:AlternateContent>
+          </a:graphicData>
+        </a:graphic>
+      </p:graphicFrame>
+      <p:graphicFrame>
+        <p:nvGraphicFramePr>
+          <p:cNvPr id="10" name="Object 9">
+            <a:extLst>
+              <a:ext uri="{FF2B5EF4-FFF2-40B4-BE49-F238E27FC236}">
+                <a16:creationId xmlns:a16="http://schemas.microsoft.com/office/drawing/2014/main" id="{A5B2F0B4-1D99-F69A-4B41-5A3294DCE7AC}"/>
+              </a:ext>
+            </a:extLst>
+          </p:cNvPr>
+          <p:cNvGraphicFramePr>
+            <a:graphicFrameLocks noChangeAspect="1"/>
+          </p:cNvGraphicFramePr>
+          <p:nvPr>
+            <p:extLst>
+              <p:ext uri="{D42A27DB-BD31-4B8C-83A1-F6EECF244321}">
+                <p14:modId xmlns:p14="http://schemas.microsoft.com/office/powerpoint/2010/main" val="556604868"/>
+              </p:ext>
+            </p:extLst>
+          </p:nvPr>
+        </p:nvGraphicFramePr>
+        <p:xfrm>
+          <a:off x="1497038" y="2067249"/>
+          <a:ext cx="619125" cy="514350"/>
+        </p:xfrm>
+        <a:graphic>
+          <a:graphicData uri="http://schemas.openxmlformats.org/presentationml/2006/ole">
+            <mc:AlternateContent xmlns:mc="http://schemas.openxmlformats.org/markup-compatibility/2006">
+              <mc:Choice xmlns:v="urn:schemas-microsoft-com:vml" Requires="v">
+                <p:oleObj name="Packager Shell Object" showAsIcon="1" r:id="rId8" imgW="619061" imgH="514350" progId="Package">
+                  <p:embed/>
+                </p:oleObj>
+              </mc:Choice>
+              <mc:Fallback>
+                <p:oleObj name="Packager Shell Object" showAsIcon="1" r:id="rId8" imgW="619061" imgH="514350" progId="Package">
+                  <p:embed/>
+                  <p:pic>
+                    <p:nvPicPr>
+                      <p:cNvPr id="0" name=""/>
+                      <p:cNvPicPr/>
+                      <p:nvPr/>
+                    </p:nvPicPr>
+                    <p:blipFill>
+                      <a:blip r:embed="rId9"/>
+                      <a:stretch>
+                        <a:fillRect/>
+                      </a:stretch>
+                    </p:blipFill>
+                    <p:spPr>
+                      <a:xfrm>
+                        <a:off x="1497038" y="2067249"/>
                         <a:ext cx="619125" cy="514350"/>
                       </a:xfrm>
                       <a:prstGeom prst="rect">
@@ -7197,10 +7215,10 @@
       </p:graphicFrame>
       <p:graphicFrame>
         <p:nvGraphicFramePr>
-          <p:cNvPr id="7" name="Object 6">
+          <p:cNvPr id="12" name="Object 11">
             <a:extLst>
               <a:ext uri="{FF2B5EF4-FFF2-40B4-BE49-F238E27FC236}">
-                <a16:creationId xmlns:a16="http://schemas.microsoft.com/office/drawing/2014/main" id="{85DA6C2F-0936-3898-0118-F4886BFEB18C}"/>
+                <a16:creationId xmlns:a16="http://schemas.microsoft.com/office/drawing/2014/main" id="{A1539E68-BEEF-1BE3-897F-F9EC06823923}"/>
               </a:ext>
             </a:extLst>
           </p:cNvPr>
@@ -7210,88 +7228,25 @@
           <p:nvPr>
             <p:extLst>
               <p:ext uri="{D42A27DB-BD31-4B8C-83A1-F6EECF244321}">
-                <p14:modId xmlns:p14="http://schemas.microsoft.com/office/powerpoint/2010/main" val="846444429"/>
+                <p14:modId xmlns:p14="http://schemas.microsoft.com/office/powerpoint/2010/main" val="1059078165"/>
               </p:ext>
             </p:extLst>
           </p:nvPr>
         </p:nvGraphicFramePr>
         <p:xfrm>
-          <a:off x="1654975" y="1949060"/>
+          <a:off x="2261260" y="2067249"/>
           <a:ext cx="438150" cy="514350"/>
         </p:xfrm>
         <a:graphic>
           <a:graphicData uri="http://schemas.openxmlformats.org/presentationml/2006/ole">
             <mc:AlternateContent xmlns:mc="http://schemas.openxmlformats.org/markup-compatibility/2006">
               <mc:Choice xmlns:v="urn:schemas-microsoft-com:vml" Requires="v">
-                <p:oleObj name="Packager Shell Object" showAsIcon="1" r:id="rId8" imgW="437978" imgH="514350" progId="Package">
+                <p:oleObj name="Packager Shell Object" showAsIcon="1" r:id="rId10" imgW="437978" imgH="514350" progId="Package">
                   <p:embed/>
                 </p:oleObj>
               </mc:Choice>
               <mc:Fallback>
-                <p:oleObj name="Packager Shell Object" showAsIcon="1" r:id="rId8" imgW="437978" imgH="514350" progId="Package">
-                  <p:embed/>
-                  <p:pic>
-                    <p:nvPicPr>
-                      <p:cNvPr id="0" name=""/>
-                      <p:cNvPicPr/>
-                      <p:nvPr/>
-                    </p:nvPicPr>
-                    <p:blipFill>
-                      <a:blip r:embed="rId9"/>
-                      <a:stretch>
-                        <a:fillRect/>
-                      </a:stretch>
-                    </p:blipFill>
-                    <p:spPr>
-                      <a:xfrm>
-                        <a:off x="1654975" y="1949060"/>
-                        <a:ext cx="438150" cy="514350"/>
-                      </a:xfrm>
-                      <a:prstGeom prst="rect">
-                        <a:avLst/>
-                      </a:prstGeom>
-                    </p:spPr>
-                  </p:pic>
-                </p:oleObj>
-              </mc:Fallback>
-            </mc:AlternateContent>
-          </a:graphicData>
-        </a:graphic>
-      </p:graphicFrame>
-      <p:graphicFrame>
-        <p:nvGraphicFramePr>
-          <p:cNvPr id="8" name="Object 7">
-            <a:extLst>
-              <a:ext uri="{FF2B5EF4-FFF2-40B4-BE49-F238E27FC236}">
-                <a16:creationId xmlns:a16="http://schemas.microsoft.com/office/drawing/2014/main" id="{D228DBCB-E3CE-71AE-B32B-6E971F24BB8D}"/>
-              </a:ext>
-            </a:extLst>
-          </p:cNvPr>
-          <p:cNvGraphicFramePr>
-            <a:graphicFrameLocks noChangeAspect="1"/>
-          </p:cNvGraphicFramePr>
-          <p:nvPr>
-            <p:extLst>
-              <p:ext uri="{D42A27DB-BD31-4B8C-83A1-F6EECF244321}">
-                <p14:modId xmlns:p14="http://schemas.microsoft.com/office/powerpoint/2010/main" val="3715923466"/>
-              </p:ext>
-            </p:extLst>
-          </p:nvPr>
-        </p:nvGraphicFramePr>
-        <p:xfrm>
-          <a:off x="344830" y="1939211"/>
-          <a:ext cx="771525" cy="514350"/>
-        </p:xfrm>
-        <a:graphic>
-          <a:graphicData uri="http://schemas.openxmlformats.org/presentationml/2006/ole">
-            <mc:AlternateContent xmlns:mc="http://schemas.openxmlformats.org/markup-compatibility/2006">
-              <mc:Choice xmlns:v="urn:schemas-microsoft-com:vml" Requires="v">
-                <p:oleObj name="Packager Shell Object" showAsIcon="1" r:id="rId10" imgW="771401" imgH="514350" progId="Package">
-                  <p:embed/>
-                </p:oleObj>
-              </mc:Choice>
-              <mc:Fallback>
-                <p:oleObj name="Packager Shell Object" showAsIcon="1" r:id="rId10" imgW="771401" imgH="514350" progId="Package">
+                <p:oleObj name="Packager Shell Object" showAsIcon="1" r:id="rId10" imgW="437978" imgH="514350" progId="Package">
                   <p:embed/>
                   <p:pic>
                     <p:nvPicPr>
@@ -7307,8 +7262,8 @@
                     </p:blipFill>
                     <p:spPr>
                       <a:xfrm>
-                        <a:off x="344830" y="1939211"/>
-                        <a:ext cx="771525" cy="514350"/>
+                        <a:off x="2261260" y="2067249"/>
+                        <a:ext cx="438150" cy="514350"/>
                       </a:xfrm>
                       <a:prstGeom prst="rect">
                         <a:avLst/>
@@ -7323,10 +7278,10 @@
       </p:graphicFrame>
       <p:pic>
         <p:nvPicPr>
-          <p:cNvPr id="11" name="Picture 10">
+          <p:cNvPr id="14" name="Picture 13">
             <a:extLst>
               <a:ext uri="{FF2B5EF4-FFF2-40B4-BE49-F238E27FC236}">
-                <a16:creationId xmlns:a16="http://schemas.microsoft.com/office/drawing/2014/main" id="{4219A118-4AB6-7858-C137-FD6983A6013E}"/>
+                <a16:creationId xmlns:a16="http://schemas.microsoft.com/office/drawing/2014/main" id="{2C41703B-84CD-2EA4-7879-027EDF350628}"/>
               </a:ext>
             </a:extLst>
           </p:cNvPr>
@@ -7343,8 +7298,8 @@
         </p:blipFill>
         <p:spPr>
           <a:xfrm>
-            <a:off x="240323" y="3644783"/>
-            <a:ext cx="4788436" cy="2448088"/>
+            <a:off x="308423" y="3552401"/>
+            <a:ext cx="4720336" cy="2706954"/>
           </a:xfrm>
           <a:prstGeom prst="rect">
             <a:avLst/>
@@ -7353,10 +7308,10 @@
       </p:pic>
       <p:pic>
         <p:nvPicPr>
-          <p:cNvPr id="17" name="Picture 16">
+          <p:cNvPr id="19" name="Picture 18">
             <a:extLst>
               <a:ext uri="{FF2B5EF4-FFF2-40B4-BE49-F238E27FC236}">
-                <a16:creationId xmlns:a16="http://schemas.microsoft.com/office/drawing/2014/main" id="{248E3CDB-7FFD-33BE-9AA0-B5795CFDBF50}"/>
+                <a16:creationId xmlns:a16="http://schemas.microsoft.com/office/drawing/2014/main" id="{DB44A57B-CB90-60B4-B2CC-3D7DA5B80BA2}"/>
               </a:ext>
             </a:extLst>
           </p:cNvPr>
@@ -7373,8 +7328,8 @@
         </p:blipFill>
         <p:spPr>
           <a:xfrm>
-            <a:off x="5739210" y="3647221"/>
-            <a:ext cx="2585064" cy="3085189"/>
+            <a:off x="5096488" y="3485234"/>
+            <a:ext cx="2839328" cy="3390724"/>
           </a:xfrm>
           <a:prstGeom prst="rect">
             <a:avLst/>
@@ -7602,7 +7557,7 @@
         <p:spPr>
           <a:xfrm>
             <a:off x="344830" y="1336675"/>
-            <a:ext cx="7409282" cy="4796826"/>
+            <a:ext cx="7409282" cy="4155625"/>
           </a:xfrm>
           <a:prstGeom prst="rect">
             <a:avLst/>
@@ -7789,53 +7744,8 @@
                 <a:latin typeface="Candara"/>
                 <a:cs typeface="Candara"/>
               </a:rPr>
-              <a:t>Observed lot of Warnings post Synthesis. Need to change RTL to fix them. Most of them are… </a:t>
-            </a:r>
-          </a:p>
-          <a:p>
-            <a:pPr marL="355600" indent="-342900">
-              <a:lnSpc>
-                <a:spcPct val="100000"/>
-              </a:lnSpc>
-              <a:spcBef>
-                <a:spcPts val="105"/>
-              </a:spcBef>
-              <a:buFont typeface="Courier New" panose="02070309020205020404" pitchFamily="49" charset="0"/>
-              <a:buChar char="o"/>
-              <a:tabLst>
-                <a:tab pos="354965" algn="l"/>
-              </a:tabLst>
-            </a:pPr>
-            <a:r>
-              <a:rPr lang="en-US" sz="2000" spc="-25" dirty="0">
-                <a:latin typeface="Candara"/>
-                <a:cs typeface="Candara"/>
-              </a:rPr>
-              <a:t>Signal or variable has multiple drivers. [CDFG2G-622]</a:t>
-            </a:r>
-            <a:endParaRPr lang="en-IN" sz="2000" spc="-25" dirty="0">
-              <a:latin typeface="Candara"/>
-              <a:cs typeface="Candara"/>
-            </a:endParaRPr>
-          </a:p>
-          <a:p>
-            <a:pPr marL="354965" indent="-342265">
-              <a:lnSpc>
-                <a:spcPct val="100000"/>
-              </a:lnSpc>
-              <a:spcBef>
-                <a:spcPts val="105"/>
-              </a:spcBef>
-              <a:buFont typeface="Arial"/>
-              <a:buChar char="•"/>
-              <a:tabLst>
-                <a:tab pos="354965" algn="l"/>
-              </a:tabLst>
-            </a:pPr>
-            <a:endParaRPr lang="en-IN" sz="2000" spc="-25" dirty="0">
-              <a:latin typeface="Candara"/>
-              <a:cs typeface="Candara"/>
-            </a:endParaRPr>
+              <a:t>Observed lot of Warnings post Synthesis. Need to change RTL to fix them when RTL code synthesized to Net List.</a:t>
+            </a:r>
           </a:p>
           <a:p>
             <a:pPr marL="354965" indent="-342265">
@@ -8012,10 +7922,10 @@
       </p:sp>
       <p:pic>
         <p:nvPicPr>
-          <p:cNvPr id="7" name="Picture 6">
+          <p:cNvPr id="8" name="Picture 7">
             <a:extLst>
               <a:ext uri="{FF2B5EF4-FFF2-40B4-BE49-F238E27FC236}">
-                <a16:creationId xmlns:a16="http://schemas.microsoft.com/office/drawing/2014/main" id="{82490DE5-AC95-1A5F-0186-FDE86A548B1F}"/>
+                <a16:creationId xmlns:a16="http://schemas.microsoft.com/office/drawing/2014/main" id="{E6F16389-ABF7-AB91-C6E5-636D9B5F5782}"/>
               </a:ext>
             </a:extLst>
           </p:cNvPr>
@@ -8032,8 +7942,8 @@
         </p:blipFill>
         <p:spPr>
           <a:xfrm>
-            <a:off x="681488" y="2939812"/>
-            <a:ext cx="6115057" cy="2990575"/>
+            <a:off x="603503" y="3140737"/>
+            <a:ext cx="6020751" cy="3086427"/>
           </a:xfrm>
           <a:prstGeom prst="rect">
             <a:avLst/>

</xml_diff>

<commit_message>
Added notes for WHAT YOU LEARNED.
</commit_message>
<xml_diff>
--- a/Project_Report/ASIC for Neural Network inference_P_V_Rajesh_Kumar.pptx
+++ b/Project_Report/ASIC for Neural Network inference_P_V_Rajesh_Kumar.pptx
@@ -11844,7 +11844,7 @@
         <p:spPr>
           <a:xfrm>
             <a:off x="344830" y="1184630"/>
-            <a:ext cx="8213954" cy="5398914"/>
+            <a:ext cx="8213954" cy="5860579"/>
           </a:xfrm>
           <a:prstGeom prst="rect">
             <a:avLst/>
@@ -12080,6 +12080,42 @@
                 <a:cs typeface="Candara"/>
               </a:rPr>
               <a:t>Verilog coding differences between FPGA &amp; ASIC for synthesizable code.</a:t>
+            </a:r>
+          </a:p>
+          <a:p>
+            <a:pPr marL="354965" indent="-342265">
+              <a:lnSpc>
+                <a:spcPct val="100000"/>
+              </a:lnSpc>
+              <a:spcBef>
+                <a:spcPts val="1200"/>
+              </a:spcBef>
+              <a:buFont typeface="Arial"/>
+              <a:buChar char="•"/>
+              <a:tabLst>
+                <a:tab pos="354965" algn="l"/>
+              </a:tabLst>
+            </a:pPr>
+            <a:r>
+              <a:rPr lang="en-IN" sz="2000" dirty="0">
+                <a:latin typeface="Candara"/>
+                <a:cs typeface="Candara"/>
+              </a:rPr>
+              <a:t>How to fix RTL when we get LEC</a:t>
+            </a:r>
+            <a:r>
+              <a:rPr lang="en-IN" sz="2000">
+                <a:latin typeface="Candara"/>
+                <a:cs typeface="Candara"/>
+              </a:rPr>
+              <a:t>/Synthesis </a:t>
+            </a:r>
+            <a:r>
+              <a:rPr lang="en-IN" sz="2000" dirty="0">
+                <a:latin typeface="Candara"/>
+                <a:cs typeface="Candara"/>
+              </a:rPr>
+              <a:t>errors.</a:t>
             </a:r>
           </a:p>
           <a:p>

</xml_diff>

<commit_message>
Project report updated with results & screenshots.
</commit_message>
<xml_diff>
--- a/Project_Report/ASIC for Neural Network inference_P_V_Rajesh_Kumar.pptx
+++ b/Project_Report/ASIC for Neural Network inference_P_V_Rajesh_Kumar.pptx
@@ -156,7 +156,7 @@
           <a:p>
             <a:fld id="{BA6A18BC-8377-41FB-854C-CD5DE3F7CB9E}" type="datetimeFigureOut">
               <a:rPr lang="en-IN" smtClean="0"/>
-              <a:t>13-04-2024</a:t>
+              <a:t>14-04-2024</a:t>
             </a:fld>
             <a:endParaRPr lang="en-IN"/>
           </a:p>
@@ -835,7 +835,7 @@
           <a:p>
             <a:fld id="{1D8BD707-D9CF-40AE-B4C6-C98DA3205C09}" type="datetimeFigureOut">
               <a:rPr lang="en-US"/>
-              <a:t>4/13/2024</a:t>
+              <a:t>4/14/2024</a:t>
             </a:fld>
             <a:endParaRPr lang="en-US"/>
           </a:p>
@@ -1102,7 +1102,7 @@
           <a:p>
             <a:fld id="{1D8BD707-D9CF-40AE-B4C6-C98DA3205C09}" type="datetimeFigureOut">
               <a:rPr lang="en-US"/>
-              <a:t>4/13/2024</a:t>
+              <a:t>4/14/2024</a:t>
             </a:fld>
             <a:endParaRPr lang="en-US"/>
           </a:p>
@@ -1406,7 +1406,7 @@
           <a:p>
             <a:fld id="{1D8BD707-D9CF-40AE-B4C6-C98DA3205C09}" type="datetimeFigureOut">
               <a:rPr lang="en-US"/>
-              <a:t>4/13/2024</a:t>
+              <a:t>4/14/2024</a:t>
             </a:fld>
             <a:endParaRPr lang="en-US"/>
           </a:p>
@@ -1644,7 +1644,7 @@
           <a:p>
             <a:fld id="{1D8BD707-D9CF-40AE-B4C6-C98DA3205C09}" type="datetimeFigureOut">
               <a:rPr lang="en-US"/>
-              <a:t>4/13/2024</a:t>
+              <a:t>4/14/2024</a:t>
             </a:fld>
             <a:endParaRPr lang="en-US"/>
           </a:p>
@@ -1853,7 +1853,7 @@
           <a:p>
             <a:fld id="{1D8BD707-D9CF-40AE-B4C6-C98DA3205C09}" type="datetimeFigureOut">
               <a:rPr lang="en-US"/>
-              <a:t>4/13/2024</a:t>
+              <a:t>4/14/2024</a:t>
             </a:fld>
             <a:endParaRPr lang="en-US"/>
           </a:p>
@@ -2304,7 +2304,7 @@
           <a:p>
             <a:fld id="{1D8BD707-D9CF-40AE-B4C6-C98DA3205C09}" type="datetimeFigureOut">
               <a:rPr lang="en-US"/>
-              <a:t>4/13/2024</a:t>
+              <a:t>4/14/2024</a:t>
             </a:fld>
             <a:endParaRPr lang="en-US"/>
           </a:p>
@@ -5181,10 +5181,10 @@
       </p:sp>
       <p:pic>
         <p:nvPicPr>
-          <p:cNvPr id="10" name="Picture 9">
+          <p:cNvPr id="7" name="Picture 6">
             <a:extLst>
               <a:ext uri="{FF2B5EF4-FFF2-40B4-BE49-F238E27FC236}">
-                <a16:creationId xmlns:a16="http://schemas.microsoft.com/office/drawing/2014/main" id="{26F97E84-B5A1-31ED-236C-17F22720BA5A}"/>
+                <a16:creationId xmlns:a16="http://schemas.microsoft.com/office/drawing/2014/main" id="{705151AA-3BF2-BD62-4CDB-262FA89E1072}"/>
               </a:ext>
             </a:extLst>
           </p:cNvPr>
@@ -5201,8 +5201,8 @@
         </p:blipFill>
         <p:spPr>
           <a:xfrm>
-            <a:off x="1044219" y="1137322"/>
-            <a:ext cx="6290954" cy="5658905"/>
+            <a:off x="2068884" y="1177627"/>
+            <a:ext cx="4854974" cy="5324270"/>
           </a:xfrm>
           <a:prstGeom prst="rect">
             <a:avLst/>
@@ -6400,10 +6400,10 @@
       </p:sp>
       <p:pic>
         <p:nvPicPr>
-          <p:cNvPr id="10" name="Picture 9">
+          <p:cNvPr id="7" name="Picture 6">
             <a:extLst>
               <a:ext uri="{FF2B5EF4-FFF2-40B4-BE49-F238E27FC236}">
-                <a16:creationId xmlns:a16="http://schemas.microsoft.com/office/drawing/2014/main" id="{10F8CD00-2B4B-14D1-E27F-5C9183435715}"/>
+                <a16:creationId xmlns:a16="http://schemas.microsoft.com/office/drawing/2014/main" id="{C537D1CA-F142-8D17-0107-FA347CF46464}"/>
               </a:ext>
             </a:extLst>
           </p:cNvPr>
@@ -6420,8 +6420,8 @@
         </p:blipFill>
         <p:spPr>
           <a:xfrm>
-            <a:off x="265114" y="1914223"/>
-            <a:ext cx="8462513" cy="4424965"/>
+            <a:off x="235267" y="2045152"/>
+            <a:ext cx="8522208" cy="4366791"/>
           </a:xfrm>
           <a:prstGeom prst="rect">
             <a:avLst/>
@@ -7183,10 +7183,13 @@
               </a:rPr>
               <a:t>Output</a:t>
             </a:r>
-            <a:endParaRPr lang="en-IN" sz="2000" spc="-10" dirty="0">
-              <a:latin typeface="Candara"/>
-              <a:cs typeface="Candara"/>
-            </a:endParaRPr>
+            <a:r>
+              <a:rPr lang="en-IN" sz="2000" spc="-10" dirty="0">
+                <a:latin typeface="Candara"/>
+                <a:cs typeface="Candara"/>
+              </a:rPr>
+              <a:t> (NC SIM)</a:t>
+            </a:r>
           </a:p>
           <a:p>
             <a:pPr marL="812800" marR="5080" lvl="1" indent="-342900">
@@ -7309,10 +7312,10 @@
       </p:sp>
       <p:pic>
         <p:nvPicPr>
-          <p:cNvPr id="7" name="Picture 6">
+          <p:cNvPr id="10" name="Picture 9">
             <a:extLst>
               <a:ext uri="{FF2B5EF4-FFF2-40B4-BE49-F238E27FC236}">
-                <a16:creationId xmlns:a16="http://schemas.microsoft.com/office/drawing/2014/main" id="{21486197-95E4-9947-8ABA-C46120952C36}"/>
+                <a16:creationId xmlns:a16="http://schemas.microsoft.com/office/drawing/2014/main" id="{B69D16A2-D0F1-3E84-2E47-E3BC63A1C225}"/>
               </a:ext>
             </a:extLst>
           </p:cNvPr>
@@ -7329,8 +7332,8 @@
         </p:blipFill>
         <p:spPr>
           <a:xfrm>
-            <a:off x="265114" y="2369026"/>
-            <a:ext cx="8462513" cy="4003618"/>
+            <a:off x="157543" y="2228614"/>
+            <a:ext cx="8677656" cy="4414095"/>
           </a:xfrm>
           <a:prstGeom prst="rect">
             <a:avLst/>
@@ -16985,7 +16988,7 @@
                 <a:latin typeface="Candara"/>
                 <a:ea typeface="+mn-ea"/>
               </a:rPr>
-              <a:t>737nSec</a:t>
+              <a:t>359 cycles</a:t>
             </a:r>
             <a:endParaRPr b="1" dirty="0">
               <a:solidFill>
@@ -17088,36 +17091,6 @@
           </a:p>
         </p:txBody>
       </p:sp>
-      <p:pic>
-        <p:nvPicPr>
-          <p:cNvPr id="8" name="Picture 7">
-            <a:extLst>
-              <a:ext uri="{FF2B5EF4-FFF2-40B4-BE49-F238E27FC236}">
-                <a16:creationId xmlns:a16="http://schemas.microsoft.com/office/drawing/2014/main" id="{0835E066-C2D4-3B60-918B-E7DB0007FC79}"/>
-              </a:ext>
-            </a:extLst>
-          </p:cNvPr>
-          <p:cNvPicPr>
-            <a:picLocks noChangeAspect="1"/>
-          </p:cNvPicPr>
-          <p:nvPr/>
-        </p:nvPicPr>
-        <p:blipFill>
-          <a:blip r:embed="rId2"/>
-          <a:stretch>
-            <a:fillRect/>
-          </a:stretch>
-        </p:blipFill>
-        <p:spPr>
-          <a:xfrm>
-            <a:off x="5583227" y="2192185"/>
-            <a:ext cx="2769244" cy="1304431"/>
-          </a:xfrm>
-          <a:prstGeom prst="rect">
-            <a:avLst/>
-          </a:prstGeom>
-        </p:spPr>
-      </p:pic>
       <p:graphicFrame>
         <p:nvGraphicFramePr>
           <p:cNvPr id="9" name="Table 8">
@@ -17804,6 +17777,36 @@
           </a:graphicData>
         </a:graphic>
       </p:graphicFrame>
+      <p:pic>
+        <p:nvPicPr>
+          <p:cNvPr id="11" name="Picture 10">
+            <a:extLst>
+              <a:ext uri="{FF2B5EF4-FFF2-40B4-BE49-F238E27FC236}">
+                <a16:creationId xmlns:a16="http://schemas.microsoft.com/office/drawing/2014/main" id="{BB926936-2CAC-04FA-4211-6B29770C0C53}"/>
+              </a:ext>
+            </a:extLst>
+          </p:cNvPr>
+          <p:cNvPicPr>
+            <a:picLocks noChangeAspect="1"/>
+          </p:cNvPicPr>
+          <p:nvPr/>
+        </p:nvPicPr>
+        <p:blipFill>
+          <a:blip r:embed="rId2"/>
+          <a:stretch>
+            <a:fillRect/>
+          </a:stretch>
+        </p:blipFill>
+        <p:spPr>
+          <a:xfrm>
+            <a:off x="5596925" y="2178202"/>
+            <a:ext cx="3367738" cy="1832397"/>
+          </a:xfrm>
+          <a:prstGeom prst="rect">
+            <a:avLst/>
+          </a:prstGeom>
+        </p:spPr>
+      </p:pic>
     </p:spTree>
   </p:cSld>
   <p:clrMapOvr>

</xml_diff>

<commit_message>
Updated Project report with Post-Synthesis schematic again.
</commit_message>
<xml_diff>
--- a/Project_Report/ASIC for Neural Network inference_P_V_Rajesh_Kumar.pptx
+++ b/Project_Report/ASIC for Neural Network inference_P_V_Rajesh_Kumar.pptx
@@ -4797,10 +4797,10 @@
       </p:sp>
       <p:pic>
         <p:nvPicPr>
-          <p:cNvPr id="10" name="Picture 9">
+          <p:cNvPr id="7" name="Picture 6">
             <a:extLst>
               <a:ext uri="{FF2B5EF4-FFF2-40B4-BE49-F238E27FC236}">
-                <a16:creationId xmlns:a16="http://schemas.microsoft.com/office/drawing/2014/main" id="{F14EFADC-6B4B-D416-8F21-BCD8434CC0E5}"/>
+                <a16:creationId xmlns:a16="http://schemas.microsoft.com/office/drawing/2014/main" id="{7266FC39-FB32-EEBE-5003-88433A2AB32B}"/>
               </a:ext>
             </a:extLst>
           </p:cNvPr>
@@ -4817,8 +4817,8 @@
         </p:blipFill>
         <p:spPr>
           <a:xfrm>
-            <a:off x="357996" y="1303573"/>
-            <a:ext cx="8428008" cy="4924473"/>
+            <a:off x="330101" y="1308781"/>
+            <a:ext cx="8497019" cy="5423629"/>
           </a:xfrm>
           <a:prstGeom prst="rect">
             <a:avLst/>

</xml_diff>